<commit_message>
Fixed coin-age, added variable difficulty to PoW. Able to run for 10 minutes and collect info
</commit_message>
<xml_diff>
--- a/Presentation.pptx
+++ b/Presentation.pptx
@@ -14,7 +14,8 @@
     <p:sldId id="261" r:id="rId8"/>
     <p:sldId id="263" r:id="rId9"/>
     <p:sldId id="265" r:id="rId10"/>
-    <p:sldId id="264" r:id="rId11"/>
+    <p:sldId id="266" r:id="rId11"/>
+    <p:sldId id="264" r:id="rId12"/>
   </p:sldIdLst>
   <p:sldSz cx="12192000" cy="6858000"/>
   <p:notesSz cx="6858000" cy="9144000"/>
@@ -6074,7 +6075,819 @@
 </file>
 
 <file path=ppt/slides/slide10.xml><?xml version="1.0" encoding="utf-8"?>
-<p:sld xmlns:a="http://schemas.openxmlformats.org/drawingml/2006/main" xmlns:r="http://schemas.openxmlformats.org/officeDocument/2006/relationships" xmlns:p="http://schemas.openxmlformats.org/presentationml/2006/main">
+<p:sld xmlns:a="http://schemas.openxmlformats.org/drawingml/2006/main" xmlns:r="http://schemas.openxmlformats.org/officeDocument/2006/relationships" xmlns:p="http://schemas.openxmlformats.org/presentationml/2006/main" showMasterSp="0">
+  <p:cSld>
+    <p:spTree>
+      <p:nvGrpSpPr>
+        <p:cNvPr id="1" name=""/>
+        <p:cNvGrpSpPr/>
+        <p:nvPr/>
+      </p:nvGrpSpPr>
+      <p:grpSpPr>
+        <a:xfrm>
+          <a:off x="0" y="0"/>
+          <a:ext cx="0" cy="0"/>
+          <a:chOff x="0" y="0"/>
+          <a:chExt cx="0" cy="0"/>
+        </a:xfrm>
+      </p:grpSpPr>
+      <p:sp>
+        <p:nvSpPr>
+          <p:cNvPr id="2" name="Title 1"/>
+          <p:cNvSpPr>
+            <a:spLocks noGrp="1"/>
+          </p:cNvSpPr>
+          <p:nvPr>
+            <p:ph type="title"/>
+          </p:nvPr>
+        </p:nvSpPr>
+        <p:spPr/>
+        <p:txBody>
+          <a:bodyPr/>
+          <a:lstStyle/>
+          <a:p>
+            <a:r>
+              <a:rPr lang="en-US" dirty="0" smtClean="0"/>
+              <a:t>Test results</a:t>
+            </a:r>
+            <a:endParaRPr lang="en-US" dirty="0"/>
+          </a:p>
+        </p:txBody>
+      </p:sp>
+      <p:sp>
+        <p:nvSpPr>
+          <p:cNvPr id="3" name="Content Placeholder 2"/>
+          <p:cNvSpPr>
+            <a:spLocks noGrp="1"/>
+          </p:cNvSpPr>
+          <p:nvPr>
+            <p:ph idx="1"/>
+          </p:nvPr>
+        </p:nvSpPr>
+        <p:spPr>
+          <a:xfrm>
+            <a:off x="122829" y="2052918"/>
+            <a:ext cx="11805313" cy="4195481"/>
+          </a:xfrm>
+        </p:spPr>
+        <p:txBody>
+          <a:bodyPr/>
+          <a:lstStyle/>
+          <a:p>
+            <a:r>
+              <a:rPr lang="en-US" dirty="0" smtClean="0"/>
+              <a:t>4 miners with variable number of coins, </a:t>
+            </a:r>
+            <a:r>
+              <a:rPr lang="en-US" dirty="0" err="1" smtClean="0"/>
+              <a:t>coinbase</a:t>
+            </a:r>
+            <a:r>
+              <a:rPr lang="en-US" dirty="0" smtClean="0"/>
+              <a:t> set to 10, run for 10 minutes</a:t>
+            </a:r>
+          </a:p>
+          <a:p>
+            <a:endParaRPr lang="en-US" dirty="0"/>
+          </a:p>
+          <a:p>
+            <a:r>
+              <a:rPr lang="en-US" dirty="0" smtClean="0"/>
+              <a:t>Minting eligibility wait 10 secs</a:t>
+            </a:r>
+          </a:p>
+          <a:p>
+            <a:endParaRPr lang="en-US" dirty="0"/>
+          </a:p>
+          <a:p>
+            <a:endParaRPr lang="en-US" dirty="0" smtClean="0"/>
+          </a:p>
+          <a:p>
+            <a:endParaRPr lang="en-US" dirty="0" smtClean="0"/>
+          </a:p>
+          <a:p>
+            <a:endParaRPr lang="en-US" dirty="0"/>
+          </a:p>
+          <a:p>
+            <a:r>
+              <a:rPr lang="en-US" dirty="0"/>
+              <a:t>Minting eligibility wait </a:t>
+            </a:r>
+            <a:r>
+              <a:rPr lang="en-US" dirty="0" smtClean="0"/>
+              <a:t>30 </a:t>
+            </a:r>
+            <a:r>
+              <a:rPr lang="en-US" dirty="0"/>
+              <a:t>secs</a:t>
+            </a:r>
+            <a:endParaRPr lang="en-US" dirty="0" smtClean="0"/>
+          </a:p>
+        </p:txBody>
+      </p:sp>
+      <p:graphicFrame>
+        <p:nvGraphicFramePr>
+          <p:cNvPr id="4" name="Table 3"/>
+          <p:cNvGraphicFramePr>
+            <a:graphicFrameLocks noGrp="1"/>
+          </p:cNvGraphicFramePr>
+          <p:nvPr>
+            <p:extLst>
+              <p:ext uri="{D42A27DB-BD31-4B8C-83A1-F6EECF244321}">
+                <p14:modId xmlns:p14="http://schemas.microsoft.com/office/powerpoint/2010/main" val="670254078"/>
+              </p:ext>
+            </p:extLst>
+          </p:nvPr>
+        </p:nvGraphicFramePr>
+        <p:xfrm>
+          <a:off x="4324839" y="2539999"/>
+          <a:ext cx="7002801" cy="1854200"/>
+        </p:xfrm>
+        <a:graphic>
+          <a:graphicData uri="http://schemas.openxmlformats.org/drawingml/2006/table">
+            <a:tbl>
+              <a:tblPr firstRow="1" bandRow="1">
+                <a:tableStyleId>{5C22544A-7EE6-4342-B048-85BDC9FD1C3A}</a:tableStyleId>
+              </a:tblPr>
+              <a:tblGrid>
+                <a:gridCol w="1652879"/>
+                <a:gridCol w="1815152"/>
+                <a:gridCol w="1692323"/>
+                <a:gridCol w="1842447"/>
+              </a:tblGrid>
+              <a:tr h="370840">
+                <a:tc>
+                  <a:txBody>
+                    <a:bodyPr/>
+                    <a:lstStyle/>
+                    <a:p>
+                      <a:pPr algn="ctr"/>
+                      <a:r>
+                        <a:rPr lang="en-US" dirty="0" smtClean="0"/>
+                        <a:t>Miner Name</a:t>
+                      </a:r>
+                      <a:endParaRPr lang="en-US" dirty="0"/>
+                    </a:p>
+                  </a:txBody>
+                  <a:tcPr/>
+                </a:tc>
+                <a:tc>
+                  <a:txBody>
+                    <a:bodyPr/>
+                    <a:lstStyle/>
+                    <a:p>
+                      <a:pPr algn="ctr"/>
+                      <a:r>
+                        <a:rPr lang="en-US" dirty="0" smtClean="0"/>
+                        <a:t>Initial balance</a:t>
+                      </a:r>
+                      <a:endParaRPr lang="en-US" dirty="0"/>
+                    </a:p>
+                  </a:txBody>
+                  <a:tcPr/>
+                </a:tc>
+                <a:tc>
+                  <a:txBody>
+                    <a:bodyPr/>
+                    <a:lstStyle/>
+                    <a:p>
+                      <a:pPr algn="ctr"/>
+                      <a:r>
+                        <a:rPr lang="en-US" dirty="0" smtClean="0"/>
+                        <a:t>Final balance</a:t>
+                      </a:r>
+                      <a:endParaRPr lang="en-US" dirty="0"/>
+                    </a:p>
+                  </a:txBody>
+                  <a:tcPr/>
+                </a:tc>
+                <a:tc>
+                  <a:txBody>
+                    <a:bodyPr/>
+                    <a:lstStyle/>
+                    <a:p>
+                      <a:pPr algn="ctr"/>
+                      <a:r>
+                        <a:rPr lang="en-US" dirty="0" smtClean="0"/>
+                        <a:t>Blocks mined</a:t>
+                      </a:r>
+                      <a:endParaRPr lang="en-US" dirty="0"/>
+                    </a:p>
+                  </a:txBody>
+                  <a:tcPr/>
+                </a:tc>
+              </a:tr>
+              <a:tr h="370840">
+                <a:tc>
+                  <a:txBody>
+                    <a:bodyPr/>
+                    <a:lstStyle/>
+                    <a:p>
+                      <a:pPr algn="ctr"/>
+                      <a:r>
+                        <a:rPr lang="en-US" dirty="0" smtClean="0"/>
+                        <a:t>Alice</a:t>
+                      </a:r>
+                      <a:endParaRPr lang="en-US" dirty="0"/>
+                    </a:p>
+                  </a:txBody>
+                  <a:tcPr/>
+                </a:tc>
+                <a:tc>
+                  <a:txBody>
+                    <a:bodyPr/>
+                    <a:lstStyle/>
+                    <a:p>
+                      <a:pPr algn="ctr"/>
+                      <a:r>
+                        <a:rPr lang="en-US" dirty="0" smtClean="0"/>
+                        <a:t>5</a:t>
+                      </a:r>
+                      <a:endParaRPr lang="en-US" dirty="0"/>
+                    </a:p>
+                  </a:txBody>
+                  <a:tcPr/>
+                </a:tc>
+                <a:tc>
+                  <a:txBody>
+                    <a:bodyPr/>
+                    <a:lstStyle/>
+                    <a:p>
+                      <a:pPr algn="ctr"/>
+                      <a:r>
+                        <a:rPr lang="en-US" dirty="0" smtClean="0"/>
+                        <a:t>25</a:t>
+                      </a:r>
+                      <a:endParaRPr lang="en-US" dirty="0"/>
+                    </a:p>
+                  </a:txBody>
+                  <a:tcPr/>
+                </a:tc>
+                <a:tc>
+                  <a:txBody>
+                    <a:bodyPr/>
+                    <a:lstStyle/>
+                    <a:p>
+                      <a:pPr algn="ctr"/>
+                      <a:r>
+                        <a:rPr lang="en-US" dirty="0" smtClean="0"/>
+                        <a:t>2</a:t>
+                      </a:r>
+                      <a:endParaRPr lang="en-US" dirty="0"/>
+                    </a:p>
+                  </a:txBody>
+                  <a:tcPr/>
+                </a:tc>
+              </a:tr>
+              <a:tr h="370840">
+                <a:tc>
+                  <a:txBody>
+                    <a:bodyPr/>
+                    <a:lstStyle/>
+                    <a:p>
+                      <a:pPr algn="ctr"/>
+                      <a:r>
+                        <a:rPr lang="en-US" dirty="0" smtClean="0"/>
+                        <a:t>Bob</a:t>
+                      </a:r>
+                      <a:endParaRPr lang="en-US" dirty="0"/>
+                    </a:p>
+                  </a:txBody>
+                  <a:tcPr/>
+                </a:tc>
+                <a:tc>
+                  <a:txBody>
+                    <a:bodyPr/>
+                    <a:lstStyle/>
+                    <a:p>
+                      <a:pPr algn="ctr"/>
+                      <a:r>
+                        <a:rPr lang="en-US" dirty="0" smtClean="0"/>
+                        <a:t>50</a:t>
+                      </a:r>
+                      <a:endParaRPr lang="en-US" dirty="0"/>
+                    </a:p>
+                  </a:txBody>
+                  <a:tcPr/>
+                </a:tc>
+                <a:tc>
+                  <a:txBody>
+                    <a:bodyPr/>
+                    <a:lstStyle/>
+                    <a:p>
+                      <a:pPr algn="ctr"/>
+                      <a:r>
+                        <a:rPr lang="en-US" dirty="0" smtClean="0"/>
+                        <a:t>80</a:t>
+                      </a:r>
+                      <a:endParaRPr lang="en-US" dirty="0"/>
+                    </a:p>
+                  </a:txBody>
+                  <a:tcPr/>
+                </a:tc>
+                <a:tc>
+                  <a:txBody>
+                    <a:bodyPr/>
+                    <a:lstStyle/>
+                    <a:p>
+                      <a:pPr algn="ctr"/>
+                      <a:r>
+                        <a:rPr lang="en-US" dirty="0" smtClean="0"/>
+                        <a:t>3</a:t>
+                      </a:r>
+                      <a:endParaRPr lang="en-US" dirty="0"/>
+                    </a:p>
+                  </a:txBody>
+                  <a:tcPr/>
+                </a:tc>
+              </a:tr>
+              <a:tr h="370840">
+                <a:tc>
+                  <a:txBody>
+                    <a:bodyPr/>
+                    <a:lstStyle/>
+                    <a:p>
+                      <a:pPr algn="ctr"/>
+                      <a:r>
+                        <a:rPr lang="en-US" dirty="0" smtClean="0"/>
+                        <a:t>Charlie</a:t>
+                      </a:r>
+                      <a:endParaRPr lang="en-US" dirty="0"/>
+                    </a:p>
+                  </a:txBody>
+                  <a:tcPr/>
+                </a:tc>
+                <a:tc>
+                  <a:txBody>
+                    <a:bodyPr/>
+                    <a:lstStyle/>
+                    <a:p>
+                      <a:pPr algn="ctr"/>
+                      <a:r>
+                        <a:rPr lang="en-US" dirty="0" smtClean="0"/>
+                        <a:t>500</a:t>
+                      </a:r>
+                      <a:endParaRPr lang="en-US" dirty="0"/>
+                    </a:p>
+                  </a:txBody>
+                  <a:tcPr/>
+                </a:tc>
+                <a:tc>
+                  <a:txBody>
+                    <a:bodyPr/>
+                    <a:lstStyle/>
+                    <a:p>
+                      <a:pPr algn="ctr"/>
+                      <a:r>
+                        <a:rPr lang="en-US" dirty="0" smtClean="0"/>
+                        <a:t>580</a:t>
+                      </a:r>
+                      <a:endParaRPr lang="en-US" dirty="0"/>
+                    </a:p>
+                  </a:txBody>
+                  <a:tcPr/>
+                </a:tc>
+                <a:tc>
+                  <a:txBody>
+                    <a:bodyPr/>
+                    <a:lstStyle/>
+                    <a:p>
+                      <a:pPr algn="ctr"/>
+                      <a:r>
+                        <a:rPr lang="en-US" dirty="0" smtClean="0"/>
+                        <a:t>8</a:t>
+                      </a:r>
+                      <a:endParaRPr lang="en-US" dirty="0"/>
+                    </a:p>
+                  </a:txBody>
+                  <a:tcPr/>
+                </a:tc>
+              </a:tr>
+              <a:tr h="370840">
+                <a:tc>
+                  <a:txBody>
+                    <a:bodyPr/>
+                    <a:lstStyle/>
+                    <a:p>
+                      <a:pPr algn="ctr"/>
+                      <a:r>
+                        <a:rPr lang="en-US" dirty="0" smtClean="0"/>
+                        <a:t>Dave</a:t>
+                      </a:r>
+                      <a:endParaRPr lang="en-US" dirty="0"/>
+                    </a:p>
+                  </a:txBody>
+                  <a:tcPr/>
+                </a:tc>
+                <a:tc>
+                  <a:txBody>
+                    <a:bodyPr/>
+                    <a:lstStyle/>
+                    <a:p>
+                      <a:pPr algn="ctr"/>
+                      <a:r>
+                        <a:rPr lang="en-US" dirty="0" smtClean="0"/>
+                        <a:t>5000</a:t>
+                      </a:r>
+                      <a:endParaRPr lang="en-US" dirty="0"/>
+                    </a:p>
+                  </a:txBody>
+                  <a:tcPr/>
+                </a:tc>
+                <a:tc>
+                  <a:txBody>
+                    <a:bodyPr/>
+                    <a:lstStyle/>
+                    <a:p>
+                      <a:pPr algn="ctr"/>
+                      <a:r>
+                        <a:rPr lang="en-US" dirty="0" smtClean="0"/>
+                        <a:t>5080</a:t>
+                      </a:r>
+                      <a:endParaRPr lang="en-US" dirty="0"/>
+                    </a:p>
+                  </a:txBody>
+                  <a:tcPr/>
+                </a:tc>
+                <a:tc>
+                  <a:txBody>
+                    <a:bodyPr/>
+                    <a:lstStyle/>
+                    <a:p>
+                      <a:pPr algn="ctr"/>
+                      <a:r>
+                        <a:rPr lang="en-US" dirty="0" smtClean="0"/>
+                        <a:t>8</a:t>
+                      </a:r>
+                      <a:endParaRPr lang="en-US" dirty="0"/>
+                    </a:p>
+                  </a:txBody>
+                  <a:tcPr/>
+                </a:tc>
+              </a:tr>
+            </a:tbl>
+          </a:graphicData>
+        </a:graphic>
+      </p:graphicFrame>
+      <p:graphicFrame>
+        <p:nvGraphicFramePr>
+          <p:cNvPr id="5" name="Table 4"/>
+          <p:cNvGraphicFramePr>
+            <a:graphicFrameLocks noGrp="1"/>
+          </p:cNvGraphicFramePr>
+          <p:nvPr>
+            <p:extLst>
+              <p:ext uri="{D42A27DB-BD31-4B8C-83A1-F6EECF244321}">
+                <p14:modId xmlns:p14="http://schemas.microsoft.com/office/powerpoint/2010/main" val="1859085717"/>
+              </p:ext>
+            </p:extLst>
+          </p:nvPr>
+        </p:nvGraphicFramePr>
+        <p:xfrm>
+          <a:off x="4324839" y="4643842"/>
+          <a:ext cx="7016449" cy="1854200"/>
+        </p:xfrm>
+        <a:graphic>
+          <a:graphicData uri="http://schemas.openxmlformats.org/drawingml/2006/table">
+            <a:tbl>
+              <a:tblPr firstRow="1" bandRow="1">
+                <a:tableStyleId>{5C22544A-7EE6-4342-B048-85BDC9FD1C3A}</a:tableStyleId>
+              </a:tblPr>
+              <a:tblGrid>
+                <a:gridCol w="1666527"/>
+                <a:gridCol w="1815152"/>
+                <a:gridCol w="1692322"/>
+                <a:gridCol w="1842448"/>
+              </a:tblGrid>
+              <a:tr h="370840">
+                <a:tc>
+                  <a:txBody>
+                    <a:bodyPr/>
+                    <a:lstStyle/>
+                    <a:p>
+                      <a:pPr algn="ctr"/>
+                      <a:r>
+                        <a:rPr lang="en-US" dirty="0" smtClean="0"/>
+                        <a:t>Miner Name</a:t>
+                      </a:r>
+                      <a:endParaRPr lang="en-US" dirty="0"/>
+                    </a:p>
+                  </a:txBody>
+                  <a:tcPr/>
+                </a:tc>
+                <a:tc>
+                  <a:txBody>
+                    <a:bodyPr/>
+                    <a:lstStyle/>
+                    <a:p>
+                      <a:pPr algn="ctr"/>
+                      <a:r>
+                        <a:rPr lang="en-US" dirty="0" smtClean="0"/>
+                        <a:t>Initial balance</a:t>
+                      </a:r>
+                      <a:endParaRPr lang="en-US" dirty="0"/>
+                    </a:p>
+                  </a:txBody>
+                  <a:tcPr/>
+                </a:tc>
+                <a:tc>
+                  <a:txBody>
+                    <a:bodyPr/>
+                    <a:lstStyle/>
+                    <a:p>
+                      <a:pPr algn="ctr"/>
+                      <a:r>
+                        <a:rPr lang="en-US" dirty="0" smtClean="0"/>
+                        <a:t>Final balance</a:t>
+                      </a:r>
+                      <a:endParaRPr lang="en-US" dirty="0"/>
+                    </a:p>
+                  </a:txBody>
+                  <a:tcPr/>
+                </a:tc>
+                <a:tc>
+                  <a:txBody>
+                    <a:bodyPr/>
+                    <a:lstStyle/>
+                    <a:p>
+                      <a:pPr algn="ctr"/>
+                      <a:r>
+                        <a:rPr lang="en-US" dirty="0" smtClean="0"/>
+                        <a:t>Blocks mined</a:t>
+                      </a:r>
+                      <a:endParaRPr lang="en-US" dirty="0"/>
+                    </a:p>
+                  </a:txBody>
+                  <a:tcPr/>
+                </a:tc>
+              </a:tr>
+              <a:tr h="370840">
+                <a:tc>
+                  <a:txBody>
+                    <a:bodyPr/>
+                    <a:lstStyle/>
+                    <a:p>
+                      <a:pPr algn="ctr"/>
+                      <a:r>
+                        <a:rPr lang="en-US" dirty="0" smtClean="0"/>
+                        <a:t>Alice</a:t>
+                      </a:r>
+                      <a:endParaRPr lang="en-US" dirty="0"/>
+                    </a:p>
+                  </a:txBody>
+                  <a:tcPr/>
+                </a:tc>
+                <a:tc>
+                  <a:txBody>
+                    <a:bodyPr/>
+                    <a:lstStyle/>
+                    <a:p>
+                      <a:pPr algn="ctr"/>
+                      <a:r>
+                        <a:rPr lang="en-US" dirty="0" smtClean="0"/>
+                        <a:t>5</a:t>
+                      </a:r>
+                      <a:endParaRPr lang="en-US" dirty="0"/>
+                    </a:p>
+                  </a:txBody>
+                  <a:tcPr/>
+                </a:tc>
+                <a:tc>
+                  <a:txBody>
+                    <a:bodyPr/>
+                    <a:lstStyle/>
+                    <a:p>
+                      <a:pPr algn="ctr"/>
+                      <a:r>
+                        <a:rPr lang="en-US" dirty="0" smtClean="0"/>
+                        <a:t>5</a:t>
+                      </a:r>
+                      <a:endParaRPr lang="en-US" dirty="0"/>
+                    </a:p>
+                  </a:txBody>
+                  <a:tcPr/>
+                </a:tc>
+                <a:tc>
+                  <a:txBody>
+                    <a:bodyPr/>
+                    <a:lstStyle/>
+                    <a:p>
+                      <a:pPr algn="ctr"/>
+                      <a:r>
+                        <a:rPr lang="en-US" dirty="0" smtClean="0"/>
+                        <a:t>0</a:t>
+                      </a:r>
+                      <a:endParaRPr lang="en-US" dirty="0"/>
+                    </a:p>
+                  </a:txBody>
+                  <a:tcPr/>
+                </a:tc>
+              </a:tr>
+              <a:tr h="370840">
+                <a:tc>
+                  <a:txBody>
+                    <a:bodyPr/>
+                    <a:lstStyle/>
+                    <a:p>
+                      <a:pPr algn="ctr"/>
+                      <a:r>
+                        <a:rPr lang="en-US" dirty="0" smtClean="0"/>
+                        <a:t>Bob</a:t>
+                      </a:r>
+                      <a:endParaRPr lang="en-US" dirty="0"/>
+                    </a:p>
+                  </a:txBody>
+                  <a:tcPr/>
+                </a:tc>
+                <a:tc>
+                  <a:txBody>
+                    <a:bodyPr/>
+                    <a:lstStyle/>
+                    <a:p>
+                      <a:pPr algn="ctr"/>
+                      <a:r>
+                        <a:rPr lang="en-US" dirty="0" smtClean="0"/>
+                        <a:t>50</a:t>
+                      </a:r>
+                      <a:endParaRPr lang="en-US" dirty="0"/>
+                    </a:p>
+                  </a:txBody>
+                  <a:tcPr/>
+                </a:tc>
+                <a:tc>
+                  <a:txBody>
+                    <a:bodyPr/>
+                    <a:lstStyle/>
+                    <a:p>
+                      <a:pPr algn="ctr"/>
+                      <a:r>
+                        <a:rPr lang="en-US" dirty="0" smtClean="0"/>
+                        <a:t>100</a:t>
+                      </a:r>
+                      <a:endParaRPr lang="en-US" dirty="0"/>
+                    </a:p>
+                  </a:txBody>
+                  <a:tcPr/>
+                </a:tc>
+                <a:tc>
+                  <a:txBody>
+                    <a:bodyPr/>
+                    <a:lstStyle/>
+                    <a:p>
+                      <a:pPr algn="ctr"/>
+                      <a:r>
+                        <a:rPr lang="en-US" dirty="0" smtClean="0"/>
+                        <a:t>5</a:t>
+                      </a:r>
+                      <a:endParaRPr lang="en-US" dirty="0"/>
+                    </a:p>
+                  </a:txBody>
+                  <a:tcPr/>
+                </a:tc>
+              </a:tr>
+              <a:tr h="370840">
+                <a:tc>
+                  <a:txBody>
+                    <a:bodyPr/>
+                    <a:lstStyle/>
+                    <a:p>
+                      <a:pPr algn="ctr"/>
+                      <a:r>
+                        <a:rPr lang="en-US" dirty="0" smtClean="0"/>
+                        <a:t>Charlie</a:t>
+                      </a:r>
+                      <a:endParaRPr lang="en-US" dirty="0"/>
+                    </a:p>
+                  </a:txBody>
+                  <a:tcPr/>
+                </a:tc>
+                <a:tc>
+                  <a:txBody>
+                    <a:bodyPr/>
+                    <a:lstStyle/>
+                    <a:p>
+                      <a:pPr algn="ctr"/>
+                      <a:r>
+                        <a:rPr lang="en-US" dirty="0" smtClean="0"/>
+                        <a:t>500</a:t>
+                      </a:r>
+                      <a:endParaRPr lang="en-US" dirty="0"/>
+                    </a:p>
+                  </a:txBody>
+                  <a:tcPr/>
+                </a:tc>
+                <a:tc>
+                  <a:txBody>
+                    <a:bodyPr/>
+                    <a:lstStyle/>
+                    <a:p>
+                      <a:pPr algn="ctr"/>
+                      <a:r>
+                        <a:rPr lang="en-US" dirty="0" smtClean="0"/>
+                        <a:t>520</a:t>
+                      </a:r>
+                      <a:endParaRPr lang="en-US" dirty="0"/>
+                    </a:p>
+                  </a:txBody>
+                  <a:tcPr/>
+                </a:tc>
+                <a:tc>
+                  <a:txBody>
+                    <a:bodyPr/>
+                    <a:lstStyle/>
+                    <a:p>
+                      <a:pPr algn="ctr"/>
+                      <a:r>
+                        <a:rPr lang="en-US" dirty="0" smtClean="0"/>
+                        <a:t>2</a:t>
+                      </a:r>
+                      <a:endParaRPr lang="en-US" dirty="0"/>
+                    </a:p>
+                  </a:txBody>
+                  <a:tcPr/>
+                </a:tc>
+              </a:tr>
+              <a:tr h="370840">
+                <a:tc>
+                  <a:txBody>
+                    <a:bodyPr/>
+                    <a:lstStyle/>
+                    <a:p>
+                      <a:pPr algn="ctr"/>
+                      <a:r>
+                        <a:rPr lang="en-US" dirty="0" smtClean="0"/>
+                        <a:t>Dave</a:t>
+                      </a:r>
+                      <a:endParaRPr lang="en-US" dirty="0"/>
+                    </a:p>
+                  </a:txBody>
+                  <a:tcPr/>
+                </a:tc>
+                <a:tc>
+                  <a:txBody>
+                    <a:bodyPr/>
+                    <a:lstStyle/>
+                    <a:p>
+                      <a:pPr algn="ctr"/>
+                      <a:r>
+                        <a:rPr lang="en-US" dirty="0" smtClean="0"/>
+                        <a:t>5000</a:t>
+                      </a:r>
+                      <a:endParaRPr lang="en-US" dirty="0"/>
+                    </a:p>
+                  </a:txBody>
+                  <a:tcPr/>
+                </a:tc>
+                <a:tc>
+                  <a:txBody>
+                    <a:bodyPr/>
+                    <a:lstStyle/>
+                    <a:p>
+                      <a:pPr algn="ctr"/>
+                      <a:r>
+                        <a:rPr lang="en-US" dirty="0" smtClean="0"/>
+                        <a:t>5090</a:t>
+                      </a:r>
+                      <a:endParaRPr lang="en-US" dirty="0"/>
+                    </a:p>
+                  </a:txBody>
+                  <a:tcPr/>
+                </a:tc>
+                <a:tc>
+                  <a:txBody>
+                    <a:bodyPr/>
+                    <a:lstStyle/>
+                    <a:p>
+                      <a:pPr algn="ctr"/>
+                      <a:r>
+                        <a:rPr lang="en-US" dirty="0" smtClean="0"/>
+                        <a:t>9</a:t>
+                      </a:r>
+                      <a:endParaRPr lang="en-US" dirty="0"/>
+                    </a:p>
+                  </a:txBody>
+                  <a:tcPr/>
+                </a:tc>
+              </a:tr>
+            </a:tbl>
+          </a:graphicData>
+        </a:graphic>
+      </p:graphicFrame>
+    </p:spTree>
+    <p:extLst>
+      <p:ext uri="{BB962C8B-B14F-4D97-AF65-F5344CB8AC3E}">
+        <p14:creationId xmlns:p14="http://schemas.microsoft.com/office/powerpoint/2010/main" val="1800735252"/>
+      </p:ext>
+    </p:extLst>
+  </p:cSld>
+  <p:clrMapOvr>
+    <a:masterClrMapping/>
+  </p:clrMapOvr>
+</p:sld>
+</file>
+
+<file path=ppt/slides/slide11.xml><?xml version="1.0" encoding="utf-8"?>
+<p:sld xmlns:a="http://schemas.openxmlformats.org/drawingml/2006/main" xmlns:r="http://schemas.openxmlformats.org/officeDocument/2006/relationships" xmlns:p="http://schemas.openxmlformats.org/presentationml/2006/main" showMasterSp="0">
   <p:cSld>
     <p:spTree>
       <p:nvGrpSpPr>
@@ -6488,6 +7301,10 @@
               </p:nvPr>
             </p:nvSpPr>
             <p:spPr>
+              <a:xfrm>
+                <a:off x="1103312" y="2052918"/>
+                <a:ext cx="9514646" cy="4195481"/>
+              </a:xfrm>
               <a:noFill/>
             </p:spPr>
             <p:txBody>
@@ -6600,19 +7417,31 @@
                       <a:rPr lang="en-US" b="0" i="1" smtClean="0">
                         <a:latin typeface="Cambria Math" charset="0"/>
                       </a:rPr>
-                      <m:t>∗</m:t>
+                      <m:t>∗(</m:t>
                     </m:r>
                     <m:r>
                       <a:rPr lang="en-US" b="0" i="1" smtClean="0">
                         <a:latin typeface="Cambria Math" charset="0"/>
                       </a:rPr>
-                      <m:t>𝑐𝑜𝑖𝑛𝐴𝑔𝑒𝐼𝑛𝐷𝑎𝑦𝑠</m:t>
+                      <m:t>𝑐𝑜𝑖𝑛𝐶h𝑎𝑖𝑛𝐿𝑒𝑣𝑒𝑙</m:t>
                     </m:r>
                     <m:r>
                       <a:rPr lang="en-US" b="0" i="1" smtClean="0">
                         <a:latin typeface="Cambria Math" charset="0"/>
                       </a:rPr>
-                      <m:t>}⌋</m:t>
+                      <m:t>−</m:t>
+                    </m:r>
+                    <m:r>
+                      <a:rPr lang="en-US" b="0" i="1" smtClean="0">
+                        <a:latin typeface="Cambria Math" charset="0"/>
+                      </a:rPr>
+                      <m:t>h𝑒𝑎𝑑𝐶h𝑎𝑖𝑛𝐿𝑒𝑣𝑒𝑙</m:t>
+                    </m:r>
+                    <m:r>
+                      <a:rPr lang="en-US" b="0" i="1" smtClean="0">
+                        <a:latin typeface="Cambria Math" charset="0"/>
+                      </a:rPr>
+                      <m:t>)}⌋</m:t>
                     </m:r>
                   </m:oMath>
                 </a14:m>
@@ -6628,7 +7457,7 @@
                 <a:pPr lvl="1"/>
                 <a:r>
                   <a:rPr lang="en-US" dirty="0" smtClean="0"/>
-                  <a:t>This depletes the coin age.</a:t>
+                  <a:t>This depletes the coin age of the coins picked.</a:t>
                 </a:r>
               </a:p>
               <a:p>
@@ -6646,6 +7475,47 @@
                 </a:r>
               </a:p>
               <a:p>
+                <a:r>
+                  <a:rPr lang="en-US" dirty="0" smtClean="0"/>
+                  <a:t>Coins with same </a:t>
+                </a:r>
+                <a:r>
+                  <a:rPr lang="en-US" dirty="0" err="1" smtClean="0"/>
+                  <a:t>chainLevel</a:t>
+                </a:r>
+                <a:r>
+                  <a:rPr lang="en-US" dirty="0" smtClean="0"/>
+                  <a:t> as head will not be used as they don</a:t>
+                </a:r>
+                <a:r>
+                  <a:rPr lang="mr-IN" dirty="0" smtClean="0"/>
+                  <a:t>’</a:t>
+                </a:r>
+                <a:r>
+                  <a:rPr lang="en-US" dirty="0" smtClean="0"/>
+                  <a:t>t contribute to the coin-age value</a:t>
+                </a:r>
+              </a:p>
+              <a:p>
+                <a:r>
+                  <a:rPr lang="en-US" dirty="0" smtClean="0"/>
+                  <a:t>My implementation picks all coins with at least 1 block layer to them.</a:t>
+                </a:r>
+              </a:p>
+              <a:p>
+                <a:pPr lvl="1"/>
+                <a:r>
+                  <a:rPr lang="en-US" dirty="0" smtClean="0"/>
+                  <a:t>Improvement </a:t>
+                </a:r>
+                <a:r>
+                  <a:rPr lang="mr-IN" dirty="0" smtClean="0"/>
+                  <a:t>–</a:t>
+                </a:r>
+                <a:r>
+                  <a:rPr lang="en-US" dirty="0" smtClean="0"/>
+                  <a:t> Only pick enough coins to reach max coin-age</a:t>
+                </a:r>
                 <a:endParaRPr lang="en-US" dirty="0"/>
               </a:p>
             </p:txBody>
@@ -6663,10 +7533,14 @@
               </p:nvPr>
             </p:nvSpPr>
             <p:spPr>
+              <a:xfrm>
+                <a:off x="1103312" y="2052918"/>
+                <a:ext cx="9514646" cy="4195481"/>
+              </a:xfrm>
               <a:blipFill rotWithShape="0">
                 <a:blip r:embed="rId2"/>
                 <a:stretch>
-                  <a:fillRect l="-341"/>
+                  <a:fillRect l="-320"/>
                 </a:stretch>
               </a:blipFill>
             </p:spPr>
@@ -6699,7 +7573,7 @@
 </file>
 
 <file path=ppt/slides/slide5.xml><?xml version="1.0" encoding="utf-8"?>
-<p:sld xmlns:a="http://schemas.openxmlformats.org/drawingml/2006/main" xmlns:r="http://schemas.openxmlformats.org/officeDocument/2006/relationships" xmlns:p="http://schemas.openxmlformats.org/presentationml/2006/main">
+<p:sld xmlns:a="http://schemas.openxmlformats.org/drawingml/2006/main" xmlns:r="http://schemas.openxmlformats.org/officeDocument/2006/relationships" xmlns:p="http://schemas.openxmlformats.org/presentationml/2006/main" showMasterSp="0">
   <p:cSld>
     <p:spTree>
       <p:nvGrpSpPr>
@@ -6894,8 +7768,8 @@
         </p:nvSpPr>
         <p:spPr>
           <a:xfrm>
-            <a:off x="5272667" y="6189545"/>
-            <a:ext cx="726481" cy="369332"/>
+            <a:off x="5078114" y="6224792"/>
+            <a:ext cx="1505540" cy="369332"/>
           </a:xfrm>
           <a:prstGeom prst="rect">
             <a:avLst/>
@@ -6914,7 +7788,7 @@
                   <a:schemeClr val="bg1"/>
                 </a:solidFill>
               </a:rPr>
-              <a:t>Days</a:t>
+              <a:t>Chain Level</a:t>
             </a:r>
             <a:endParaRPr lang="en-US" dirty="0">
               <a:solidFill>
@@ -7256,7 +8130,7 @@
 </file>
 
 <file path=ppt/slides/slide8.xml><?xml version="1.0" encoding="utf-8"?>
-<p:sld xmlns:a="http://schemas.openxmlformats.org/drawingml/2006/main" xmlns:r="http://schemas.openxmlformats.org/officeDocument/2006/relationships" xmlns:p="http://schemas.openxmlformats.org/presentationml/2006/main">
+<p:sld xmlns:a="http://schemas.openxmlformats.org/drawingml/2006/main" xmlns:r="http://schemas.openxmlformats.org/officeDocument/2006/relationships" xmlns:p="http://schemas.openxmlformats.org/presentationml/2006/main" showMasterSp="0">
   <p:cSld>
     <p:spTree>
       <p:nvGrpSpPr>
@@ -7346,6 +8220,20 @@
             </a:r>
           </a:p>
           <a:p>
+            <a:pPr lvl="2"/>
+            <a:r>
+              <a:rPr lang="en-US" dirty="0" smtClean="0"/>
+              <a:t>Revert any transaction in wallet for miners that didn’t win</a:t>
+            </a:r>
+          </a:p>
+          <a:p>
+            <a:pPr lvl="1"/>
+            <a:r>
+              <a:rPr lang="en-US" dirty="0" smtClean="0"/>
+              <a:t>Clients should also have access and knowledge of chain</a:t>
+            </a:r>
+          </a:p>
+          <a:p>
             <a:pPr lvl="1"/>
             <a:r>
               <a:rPr lang="en-US" dirty="0" smtClean="0"/>
@@ -7386,7 +8274,7 @@
 </file>
 
 <file path=ppt/slides/slide9.xml><?xml version="1.0" encoding="utf-8"?>
-<p:sld xmlns:a="http://schemas.openxmlformats.org/drawingml/2006/main" xmlns:r="http://schemas.openxmlformats.org/officeDocument/2006/relationships" xmlns:p="http://schemas.openxmlformats.org/presentationml/2006/main">
+<p:sld xmlns:a="http://schemas.openxmlformats.org/drawingml/2006/main" xmlns:r="http://schemas.openxmlformats.org/officeDocument/2006/relationships" xmlns:p="http://schemas.openxmlformats.org/presentationml/2006/main" showMasterSp="0">
   <p:cSld>
     <p:spTree>
       <p:nvGrpSpPr>
@@ -7440,7 +8328,7 @@
           <a:bodyPr/>
           <a:lstStyle/>
           <a:p>
-            <a:endParaRPr lang="en-US"/>
+            <a:endParaRPr lang="en-US" dirty="0"/>
           </a:p>
         </p:txBody>
       </p:sp>

</xml_diff>

<commit_message>
Fixed slides. Changed formula to match code
</commit_message>
<xml_diff>
--- a/Presentation.pptx
+++ b/Presentation.pptx
@@ -4,6 +4,9 @@
   <p:sldMasterIdLst>
     <p:sldMasterId id="2147483648" r:id="rId1"/>
   </p:sldMasterIdLst>
+  <p:notesMasterIdLst>
+    <p:notesMasterId r:id="rId12"/>
+  </p:notesMasterIdLst>
   <p:sldIdLst>
     <p:sldId id="256" r:id="rId2"/>
     <p:sldId id="257" r:id="rId3"/>
@@ -12,10 +15,9 @@
     <p:sldId id="262" r:id="rId6"/>
     <p:sldId id="260" r:id="rId7"/>
     <p:sldId id="261" r:id="rId8"/>
-    <p:sldId id="263" r:id="rId9"/>
-    <p:sldId id="265" r:id="rId10"/>
-    <p:sldId id="266" r:id="rId11"/>
-    <p:sldId id="264" r:id="rId12"/>
+    <p:sldId id="266" r:id="rId9"/>
+    <p:sldId id="263" r:id="rId10"/>
+    <p:sldId id="264" r:id="rId11"/>
   </p:sldIdLst>
   <p:sldSz cx="12192000" cy="6858000"/>
   <p:notesSz cx="6858000" cy="9144000"/>
@@ -115,6 +117,448 @@
     </a:lvl9pPr>
   </p:defaultTextStyle>
 </p:presentation>
+</file>
+
+<file path=ppt/notesMasters/notesMaster1.xml><?xml version="1.0" encoding="utf-8"?>
+<p:notesMaster xmlns:a="http://schemas.openxmlformats.org/drawingml/2006/main" xmlns:r="http://schemas.openxmlformats.org/officeDocument/2006/relationships" xmlns:p="http://schemas.openxmlformats.org/presentationml/2006/main">
+  <p:cSld>
+    <p:bg>
+      <p:bgRef idx="1001">
+        <a:schemeClr val="bg1"/>
+      </p:bgRef>
+    </p:bg>
+    <p:spTree>
+      <p:nvGrpSpPr>
+        <p:cNvPr id="1" name=""/>
+        <p:cNvGrpSpPr/>
+        <p:nvPr/>
+      </p:nvGrpSpPr>
+      <p:grpSpPr>
+        <a:xfrm>
+          <a:off x="0" y="0"/>
+          <a:ext cx="0" cy="0"/>
+          <a:chOff x="0" y="0"/>
+          <a:chExt cx="0" cy="0"/>
+        </a:xfrm>
+      </p:grpSpPr>
+      <p:sp>
+        <p:nvSpPr>
+          <p:cNvPr id="2" name="Header Placeholder 1"/>
+          <p:cNvSpPr>
+            <a:spLocks noGrp="1"/>
+          </p:cNvSpPr>
+          <p:nvPr>
+            <p:ph type="hdr" sz="quarter"/>
+          </p:nvPr>
+        </p:nvSpPr>
+        <p:spPr>
+          <a:xfrm>
+            <a:off x="0" y="0"/>
+            <a:ext cx="2971800" cy="458788"/>
+          </a:xfrm>
+          <a:prstGeom prst="rect">
+            <a:avLst/>
+          </a:prstGeom>
+        </p:spPr>
+        <p:txBody>
+          <a:bodyPr vert="horz" lIns="91440" tIns="45720" rIns="91440" bIns="45720" rtlCol="0"/>
+          <a:lstStyle>
+            <a:lvl1pPr algn="l">
+              <a:defRPr sz="1200"/>
+            </a:lvl1pPr>
+          </a:lstStyle>
+          <a:p>
+            <a:endParaRPr lang="en-US"/>
+          </a:p>
+        </p:txBody>
+      </p:sp>
+      <p:sp>
+        <p:nvSpPr>
+          <p:cNvPr id="3" name="Date Placeholder 2"/>
+          <p:cNvSpPr>
+            <a:spLocks noGrp="1"/>
+          </p:cNvSpPr>
+          <p:nvPr>
+            <p:ph type="dt" idx="1"/>
+          </p:nvPr>
+        </p:nvSpPr>
+        <p:spPr>
+          <a:xfrm>
+            <a:off x="3884613" y="0"/>
+            <a:ext cx="2971800" cy="458788"/>
+          </a:xfrm>
+          <a:prstGeom prst="rect">
+            <a:avLst/>
+          </a:prstGeom>
+        </p:spPr>
+        <p:txBody>
+          <a:bodyPr vert="horz" lIns="91440" tIns="45720" rIns="91440" bIns="45720" rtlCol="0"/>
+          <a:lstStyle>
+            <a:lvl1pPr algn="r">
+              <a:defRPr sz="1200"/>
+            </a:lvl1pPr>
+          </a:lstStyle>
+          <a:p>
+            <a:fld id="{8FE87BF6-2F74-1C4F-99D0-7C2E558E3848}" type="datetimeFigureOut">
+              <a:rPr lang="en-US" smtClean="0"/>
+              <a:t>5/3/19</a:t>
+            </a:fld>
+            <a:endParaRPr lang="en-US"/>
+          </a:p>
+        </p:txBody>
+      </p:sp>
+      <p:sp>
+        <p:nvSpPr>
+          <p:cNvPr id="4" name="Slide Image Placeholder 3"/>
+          <p:cNvSpPr>
+            <a:spLocks noGrp="1" noRot="1" noChangeAspect="1"/>
+          </p:cNvSpPr>
+          <p:nvPr>
+            <p:ph type="sldImg" idx="2"/>
+          </p:nvPr>
+        </p:nvSpPr>
+        <p:spPr>
+          <a:xfrm>
+            <a:off x="685800" y="1143000"/>
+            <a:ext cx="5486400" cy="3086100"/>
+          </a:xfrm>
+          <a:prstGeom prst="rect">
+            <a:avLst/>
+          </a:prstGeom>
+          <a:noFill/>
+          <a:ln w="12700">
+            <a:solidFill>
+              <a:prstClr val="black"/>
+            </a:solidFill>
+          </a:ln>
+        </p:spPr>
+        <p:txBody>
+          <a:bodyPr vert="horz" lIns="91440" tIns="45720" rIns="91440" bIns="45720" rtlCol="0" anchor="ctr"/>
+          <a:lstStyle/>
+          <a:p>
+            <a:endParaRPr lang="en-US"/>
+          </a:p>
+        </p:txBody>
+      </p:sp>
+      <p:sp>
+        <p:nvSpPr>
+          <p:cNvPr id="5" name="Notes Placeholder 4"/>
+          <p:cNvSpPr>
+            <a:spLocks noGrp="1"/>
+          </p:cNvSpPr>
+          <p:nvPr>
+            <p:ph type="body" sz="quarter" idx="3"/>
+          </p:nvPr>
+        </p:nvSpPr>
+        <p:spPr>
+          <a:xfrm>
+            <a:off x="685800" y="4400550"/>
+            <a:ext cx="5486400" cy="3600450"/>
+          </a:xfrm>
+          <a:prstGeom prst="rect">
+            <a:avLst/>
+          </a:prstGeom>
+        </p:spPr>
+        <p:txBody>
+          <a:bodyPr vert="horz" lIns="91440" tIns="45720" rIns="91440" bIns="45720" rtlCol="0"/>
+          <a:lstStyle/>
+          <a:p>
+            <a:pPr lvl="0"/>
+            <a:r>
+              <a:rPr lang="en-US" smtClean="0"/>
+              <a:t>Click to edit Master text styles</a:t>
+            </a:r>
+          </a:p>
+          <a:p>
+            <a:pPr lvl="1"/>
+            <a:r>
+              <a:rPr lang="en-US" smtClean="0"/>
+              <a:t>Second level</a:t>
+            </a:r>
+          </a:p>
+          <a:p>
+            <a:pPr lvl="2"/>
+            <a:r>
+              <a:rPr lang="en-US" smtClean="0"/>
+              <a:t>Third level</a:t>
+            </a:r>
+          </a:p>
+          <a:p>
+            <a:pPr lvl="3"/>
+            <a:r>
+              <a:rPr lang="en-US" smtClean="0"/>
+              <a:t>Fourth level</a:t>
+            </a:r>
+          </a:p>
+          <a:p>
+            <a:pPr lvl="4"/>
+            <a:r>
+              <a:rPr lang="en-US" smtClean="0"/>
+              <a:t>Fifth level</a:t>
+            </a:r>
+            <a:endParaRPr lang="en-US"/>
+          </a:p>
+        </p:txBody>
+      </p:sp>
+      <p:sp>
+        <p:nvSpPr>
+          <p:cNvPr id="6" name="Footer Placeholder 5"/>
+          <p:cNvSpPr>
+            <a:spLocks noGrp="1"/>
+          </p:cNvSpPr>
+          <p:nvPr>
+            <p:ph type="ftr" sz="quarter" idx="4"/>
+          </p:nvPr>
+        </p:nvSpPr>
+        <p:spPr>
+          <a:xfrm>
+            <a:off x="0" y="8685213"/>
+            <a:ext cx="2971800" cy="458787"/>
+          </a:xfrm>
+          <a:prstGeom prst="rect">
+            <a:avLst/>
+          </a:prstGeom>
+        </p:spPr>
+        <p:txBody>
+          <a:bodyPr vert="horz" lIns="91440" tIns="45720" rIns="91440" bIns="45720" rtlCol="0" anchor="b"/>
+          <a:lstStyle>
+            <a:lvl1pPr algn="l">
+              <a:defRPr sz="1200"/>
+            </a:lvl1pPr>
+          </a:lstStyle>
+          <a:p>
+            <a:endParaRPr lang="en-US"/>
+          </a:p>
+        </p:txBody>
+      </p:sp>
+      <p:sp>
+        <p:nvSpPr>
+          <p:cNvPr id="7" name="Slide Number Placeholder 6"/>
+          <p:cNvSpPr>
+            <a:spLocks noGrp="1"/>
+          </p:cNvSpPr>
+          <p:nvPr>
+            <p:ph type="sldNum" sz="quarter" idx="5"/>
+          </p:nvPr>
+        </p:nvSpPr>
+        <p:spPr>
+          <a:xfrm>
+            <a:off x="3884613" y="8685213"/>
+            <a:ext cx="2971800" cy="458787"/>
+          </a:xfrm>
+          <a:prstGeom prst="rect">
+            <a:avLst/>
+          </a:prstGeom>
+        </p:spPr>
+        <p:txBody>
+          <a:bodyPr vert="horz" lIns="91440" tIns="45720" rIns="91440" bIns="45720" rtlCol="0" anchor="b"/>
+          <a:lstStyle>
+            <a:lvl1pPr algn="r">
+              <a:defRPr sz="1200"/>
+            </a:lvl1pPr>
+          </a:lstStyle>
+          <a:p>
+            <a:fld id="{C0B4C2E9-E67B-8E42-9319-54746B5B18C1}" type="slidenum">
+              <a:rPr lang="en-US" smtClean="0"/>
+              <a:t>‹#›</a:t>
+            </a:fld>
+            <a:endParaRPr lang="en-US"/>
+          </a:p>
+        </p:txBody>
+      </p:sp>
+    </p:spTree>
+    <p:extLst>
+      <p:ext uri="{BB962C8B-B14F-4D97-AF65-F5344CB8AC3E}">
+        <p14:creationId xmlns:p14="http://schemas.microsoft.com/office/powerpoint/2010/main" val="239031313"/>
+      </p:ext>
+    </p:extLst>
+  </p:cSld>
+  <p:clrMap bg1="lt1" tx1="dk1" bg2="lt2" tx2="dk2" accent1="accent1" accent2="accent2" accent3="accent3" accent4="accent4" accent5="accent5" accent6="accent6" hlink="hlink" folHlink="folHlink"/>
+  <p:notesStyle>
+    <a:lvl1pPr marL="0" algn="l" defTabSz="914400" rtl="0" eaLnBrk="1" latinLnBrk="0" hangingPunct="1">
+      <a:defRPr sz="1200" kern="1200">
+        <a:solidFill>
+          <a:schemeClr val="tx1"/>
+        </a:solidFill>
+        <a:latin typeface="+mn-lt"/>
+        <a:ea typeface="+mn-ea"/>
+        <a:cs typeface="+mn-cs"/>
+      </a:defRPr>
+    </a:lvl1pPr>
+    <a:lvl2pPr marL="457200" algn="l" defTabSz="914400" rtl="0" eaLnBrk="1" latinLnBrk="0" hangingPunct="1">
+      <a:defRPr sz="1200" kern="1200">
+        <a:solidFill>
+          <a:schemeClr val="tx1"/>
+        </a:solidFill>
+        <a:latin typeface="+mn-lt"/>
+        <a:ea typeface="+mn-ea"/>
+        <a:cs typeface="+mn-cs"/>
+      </a:defRPr>
+    </a:lvl2pPr>
+    <a:lvl3pPr marL="914400" algn="l" defTabSz="914400" rtl="0" eaLnBrk="1" latinLnBrk="0" hangingPunct="1">
+      <a:defRPr sz="1200" kern="1200">
+        <a:solidFill>
+          <a:schemeClr val="tx1"/>
+        </a:solidFill>
+        <a:latin typeface="+mn-lt"/>
+        <a:ea typeface="+mn-ea"/>
+        <a:cs typeface="+mn-cs"/>
+      </a:defRPr>
+    </a:lvl3pPr>
+    <a:lvl4pPr marL="1371600" algn="l" defTabSz="914400" rtl="0" eaLnBrk="1" latinLnBrk="0" hangingPunct="1">
+      <a:defRPr sz="1200" kern="1200">
+        <a:solidFill>
+          <a:schemeClr val="tx1"/>
+        </a:solidFill>
+        <a:latin typeface="+mn-lt"/>
+        <a:ea typeface="+mn-ea"/>
+        <a:cs typeface="+mn-cs"/>
+      </a:defRPr>
+    </a:lvl4pPr>
+    <a:lvl5pPr marL="1828800" algn="l" defTabSz="914400" rtl="0" eaLnBrk="1" latinLnBrk="0" hangingPunct="1">
+      <a:defRPr sz="1200" kern="1200">
+        <a:solidFill>
+          <a:schemeClr val="tx1"/>
+        </a:solidFill>
+        <a:latin typeface="+mn-lt"/>
+        <a:ea typeface="+mn-ea"/>
+        <a:cs typeface="+mn-cs"/>
+      </a:defRPr>
+    </a:lvl5pPr>
+    <a:lvl6pPr marL="2286000" algn="l" defTabSz="914400" rtl="0" eaLnBrk="1" latinLnBrk="0" hangingPunct="1">
+      <a:defRPr sz="1200" kern="1200">
+        <a:solidFill>
+          <a:schemeClr val="tx1"/>
+        </a:solidFill>
+        <a:latin typeface="+mn-lt"/>
+        <a:ea typeface="+mn-ea"/>
+        <a:cs typeface="+mn-cs"/>
+      </a:defRPr>
+    </a:lvl6pPr>
+    <a:lvl7pPr marL="2743200" algn="l" defTabSz="914400" rtl="0" eaLnBrk="1" latinLnBrk="0" hangingPunct="1">
+      <a:defRPr sz="1200" kern="1200">
+        <a:solidFill>
+          <a:schemeClr val="tx1"/>
+        </a:solidFill>
+        <a:latin typeface="+mn-lt"/>
+        <a:ea typeface="+mn-ea"/>
+        <a:cs typeface="+mn-cs"/>
+      </a:defRPr>
+    </a:lvl7pPr>
+    <a:lvl8pPr marL="3200400" algn="l" defTabSz="914400" rtl="0" eaLnBrk="1" latinLnBrk="0" hangingPunct="1">
+      <a:defRPr sz="1200" kern="1200">
+        <a:solidFill>
+          <a:schemeClr val="tx1"/>
+        </a:solidFill>
+        <a:latin typeface="+mn-lt"/>
+        <a:ea typeface="+mn-ea"/>
+        <a:cs typeface="+mn-cs"/>
+      </a:defRPr>
+    </a:lvl8pPr>
+    <a:lvl9pPr marL="3657600" algn="l" defTabSz="914400" rtl="0" eaLnBrk="1" latinLnBrk="0" hangingPunct="1">
+      <a:defRPr sz="1200" kern="1200">
+        <a:solidFill>
+          <a:schemeClr val="tx1"/>
+        </a:solidFill>
+        <a:latin typeface="+mn-lt"/>
+        <a:ea typeface="+mn-ea"/>
+        <a:cs typeface="+mn-cs"/>
+      </a:defRPr>
+    </a:lvl9pPr>
+  </p:notesStyle>
+</p:notesMaster>
+</file>
+
+<file path=ppt/notesSlides/notesSlide1.xml><?xml version="1.0" encoding="utf-8"?>
+<p:notes xmlns:a="http://schemas.openxmlformats.org/drawingml/2006/main" xmlns:r="http://schemas.openxmlformats.org/officeDocument/2006/relationships" xmlns:p="http://schemas.openxmlformats.org/presentationml/2006/main">
+  <p:cSld>
+    <p:spTree>
+      <p:nvGrpSpPr>
+        <p:cNvPr id="1" name=""/>
+        <p:cNvGrpSpPr/>
+        <p:nvPr/>
+      </p:nvGrpSpPr>
+      <p:grpSpPr>
+        <a:xfrm>
+          <a:off x="0" y="0"/>
+          <a:ext cx="0" cy="0"/>
+          <a:chOff x="0" y="0"/>
+          <a:chExt cx="0" cy="0"/>
+        </a:xfrm>
+      </p:grpSpPr>
+      <p:sp>
+        <p:nvSpPr>
+          <p:cNvPr id="2" name="Slide Image Placeholder 1"/>
+          <p:cNvSpPr>
+            <a:spLocks noGrp="1" noRot="1" noChangeAspect="1"/>
+          </p:cNvSpPr>
+          <p:nvPr>
+            <p:ph type="sldImg"/>
+          </p:nvPr>
+        </p:nvSpPr>
+        <p:spPr/>
+      </p:sp>
+      <p:sp>
+        <p:nvSpPr>
+          <p:cNvPr id="3" name="Notes Placeholder 2"/>
+          <p:cNvSpPr>
+            <a:spLocks noGrp="1"/>
+          </p:cNvSpPr>
+          <p:nvPr>
+            <p:ph type="body" idx="1"/>
+          </p:nvPr>
+        </p:nvSpPr>
+        <p:spPr/>
+        <p:txBody>
+          <a:bodyPr/>
+          <a:lstStyle/>
+          <a:p>
+            <a:r>
+              <a:rPr lang="en-US" dirty="0" smtClean="0"/>
+              <a:t>takeaway: find a good balance between coin-age formula</a:t>
+            </a:r>
+            <a:r>
+              <a:rPr lang="en-US" baseline="0" dirty="0" smtClean="0"/>
+              <a:t> and eligibility wait time to achieve most distributed and fair mining</a:t>
+            </a:r>
+            <a:endParaRPr lang="en-US" dirty="0"/>
+          </a:p>
+        </p:txBody>
+      </p:sp>
+      <p:sp>
+        <p:nvSpPr>
+          <p:cNvPr id="4" name="Slide Number Placeholder 3"/>
+          <p:cNvSpPr>
+            <a:spLocks noGrp="1"/>
+          </p:cNvSpPr>
+          <p:nvPr>
+            <p:ph type="sldNum" sz="quarter" idx="10"/>
+          </p:nvPr>
+        </p:nvSpPr>
+        <p:spPr/>
+        <p:txBody>
+          <a:bodyPr/>
+          <a:lstStyle/>
+          <a:p>
+            <a:fld id="{C0B4C2E9-E67B-8E42-9319-54746B5B18C1}" type="slidenum">
+              <a:rPr lang="en-US" smtClean="0"/>
+              <a:t>8</a:t>
+            </a:fld>
+            <a:endParaRPr lang="en-US"/>
+          </a:p>
+        </p:txBody>
+      </p:sp>
+    </p:spTree>
+    <p:extLst>
+      <p:ext uri="{BB962C8B-B14F-4D97-AF65-F5344CB8AC3E}">
+        <p14:creationId xmlns:p14="http://schemas.microsoft.com/office/powerpoint/2010/main" val="1604857701"/>
+      </p:ext>
+    </p:extLst>
+  </p:cSld>
+  <p:clrMapOvr>
+    <a:masterClrMapping/>
+  </p:clrMapOvr>
+</p:notes>
 </file>
 
 <file path=ppt/slideLayouts/slideLayout1.xml><?xml version="1.0" encoding="utf-8"?>
@@ -6071,6 +6515,13 @@
   <p:clrMapOvr>
     <a:masterClrMapping/>
   </p:clrMapOvr>
+  <p:timing>
+    <p:tnLst>
+      <p:par>
+        <p:cTn id="1" dur="indefinite" restart="never" nodeType="tmRoot"/>
+      </p:par>
+    </p:tnLst>
+  </p:timing>
 </p:sld>
 </file>
 
@@ -6108,6 +6559,1519 @@
           <a:p>
             <a:r>
               <a:rPr lang="en-US" dirty="0" smtClean="0"/>
+              <a:t>Thank you</a:t>
+            </a:r>
+            <a:endParaRPr lang="en-US" dirty="0"/>
+          </a:p>
+        </p:txBody>
+      </p:sp>
+      <p:sp>
+        <p:nvSpPr>
+          <p:cNvPr id="3" name="Content Placeholder 2"/>
+          <p:cNvSpPr>
+            <a:spLocks noGrp="1"/>
+          </p:cNvSpPr>
+          <p:nvPr>
+            <p:ph idx="1"/>
+          </p:nvPr>
+        </p:nvSpPr>
+        <p:spPr/>
+        <p:txBody>
+          <a:bodyPr/>
+          <a:lstStyle/>
+          <a:p>
+            <a:endParaRPr lang="en-US"/>
+          </a:p>
+        </p:txBody>
+      </p:sp>
+    </p:spTree>
+    <p:extLst>
+      <p:ext uri="{BB962C8B-B14F-4D97-AF65-F5344CB8AC3E}">
+        <p14:creationId xmlns:p14="http://schemas.microsoft.com/office/powerpoint/2010/main" val="1257405194"/>
+      </p:ext>
+    </p:extLst>
+  </p:cSld>
+  <p:clrMapOvr>
+    <a:masterClrMapping/>
+  </p:clrMapOvr>
+  <p:timing>
+    <p:tnLst>
+      <p:par>
+        <p:cTn id="1" dur="indefinite" restart="never" nodeType="tmRoot"/>
+      </p:par>
+    </p:tnLst>
+  </p:timing>
+</p:sld>
+</file>
+
+<file path=ppt/slides/slide2.xml><?xml version="1.0" encoding="utf-8"?>
+<p:sld xmlns:a="http://schemas.openxmlformats.org/drawingml/2006/main" xmlns:r="http://schemas.openxmlformats.org/officeDocument/2006/relationships" xmlns:p="http://schemas.openxmlformats.org/presentationml/2006/main" showMasterSp="0">
+  <p:cSld>
+    <p:spTree>
+      <p:nvGrpSpPr>
+        <p:cNvPr id="1" name=""/>
+        <p:cNvGrpSpPr/>
+        <p:nvPr/>
+      </p:nvGrpSpPr>
+      <p:grpSpPr>
+        <a:xfrm>
+          <a:off x="0" y="0"/>
+          <a:ext cx="0" cy="0"/>
+          <a:chOff x="0" y="0"/>
+          <a:chExt cx="0" cy="0"/>
+        </a:xfrm>
+      </p:grpSpPr>
+      <p:sp>
+        <p:nvSpPr>
+          <p:cNvPr id="2" name="Title 1"/>
+          <p:cNvSpPr>
+            <a:spLocks noGrp="1"/>
+          </p:cNvSpPr>
+          <p:nvPr>
+            <p:ph type="title"/>
+          </p:nvPr>
+        </p:nvSpPr>
+        <p:spPr/>
+        <p:txBody>
+          <a:bodyPr/>
+          <a:lstStyle/>
+          <a:p>
+            <a:r>
+              <a:rPr lang="en-US" dirty="0" smtClean="0"/>
+              <a:t>Idea</a:t>
+            </a:r>
+            <a:endParaRPr lang="en-US" dirty="0"/>
+          </a:p>
+        </p:txBody>
+      </p:sp>
+      <p:sp>
+        <p:nvSpPr>
+          <p:cNvPr id="3" name="Content Placeholder 2"/>
+          <p:cNvSpPr>
+            <a:spLocks noGrp="1"/>
+          </p:cNvSpPr>
+          <p:nvPr>
+            <p:ph idx="1"/>
+          </p:nvPr>
+        </p:nvSpPr>
+        <p:spPr/>
+        <p:txBody>
+          <a:bodyPr/>
+          <a:lstStyle/>
+          <a:p>
+            <a:r>
+              <a:rPr lang="en-US" dirty="0" smtClean="0"/>
+              <a:t>Based on Bitcoin Lite homework project</a:t>
+            </a:r>
+          </a:p>
+          <a:p>
+            <a:r>
+              <a:rPr lang="en-US" dirty="0" smtClean="0"/>
+              <a:t>Add Minting Eligibility - Novelty</a:t>
+            </a:r>
+          </a:p>
+          <a:p>
+            <a:r>
+              <a:rPr lang="en-US" dirty="0" smtClean="0"/>
+              <a:t>Add Coin-Age </a:t>
+            </a:r>
+            <a:r>
+              <a:rPr lang="mr-IN" dirty="0" smtClean="0"/>
+              <a:t>–</a:t>
+            </a:r>
+            <a:r>
+              <a:rPr lang="en-US" dirty="0" smtClean="0"/>
+              <a:t> based on PeerCoin</a:t>
+            </a:r>
+            <a:endParaRPr lang="en-US" dirty="0"/>
+          </a:p>
+        </p:txBody>
+      </p:sp>
+    </p:spTree>
+    <p:extLst>
+      <p:ext uri="{BB962C8B-B14F-4D97-AF65-F5344CB8AC3E}">
+        <p14:creationId xmlns:p14="http://schemas.microsoft.com/office/powerpoint/2010/main" val="777177697"/>
+      </p:ext>
+    </p:extLst>
+  </p:cSld>
+  <p:clrMapOvr>
+    <a:masterClrMapping/>
+  </p:clrMapOvr>
+  <p:timing>
+    <p:tnLst>
+      <p:par>
+        <p:cTn id="1" dur="indefinite" restart="never" nodeType="tmRoot"/>
+      </p:par>
+    </p:tnLst>
+  </p:timing>
+</p:sld>
+</file>
+
+<file path=ppt/slides/slide3.xml><?xml version="1.0" encoding="utf-8"?>
+<p:sld xmlns:a="http://schemas.openxmlformats.org/drawingml/2006/main" xmlns:r="http://schemas.openxmlformats.org/officeDocument/2006/relationships" xmlns:p="http://schemas.openxmlformats.org/presentationml/2006/main" showMasterSp="0">
+  <p:cSld>
+    <p:spTree>
+      <p:nvGrpSpPr>
+        <p:cNvPr id="1" name=""/>
+        <p:cNvGrpSpPr/>
+        <p:nvPr/>
+      </p:nvGrpSpPr>
+      <p:grpSpPr>
+        <a:xfrm>
+          <a:off x="0" y="0"/>
+          <a:ext cx="0" cy="0"/>
+          <a:chOff x="0" y="0"/>
+          <a:chExt cx="0" cy="0"/>
+        </a:xfrm>
+      </p:grpSpPr>
+      <p:sp>
+        <p:nvSpPr>
+          <p:cNvPr id="2" name="Title 1"/>
+          <p:cNvSpPr>
+            <a:spLocks noGrp="1"/>
+          </p:cNvSpPr>
+          <p:nvPr>
+            <p:ph type="title"/>
+          </p:nvPr>
+        </p:nvSpPr>
+        <p:spPr/>
+        <p:txBody>
+          <a:bodyPr/>
+          <a:lstStyle/>
+          <a:p>
+            <a:r>
+              <a:rPr lang="en-US" dirty="0" smtClean="0"/>
+              <a:t>Minting Eligibility</a:t>
+            </a:r>
+            <a:endParaRPr lang="en-US" dirty="0"/>
+          </a:p>
+        </p:txBody>
+      </p:sp>
+      <mc:AlternateContent xmlns:mc="http://schemas.openxmlformats.org/markup-compatibility/2006">
+        <mc:Choice xmlns:a14="http://schemas.microsoft.com/office/drawing/2010/main" Requires="a14">
+          <p:sp>
+            <p:nvSpPr>
+              <p:cNvPr id="3" name="Content Placeholder 2"/>
+              <p:cNvSpPr>
+                <a:spLocks noGrp="1"/>
+              </p:cNvSpPr>
+              <p:nvPr>
+                <p:ph idx="1"/>
+              </p:nvPr>
+            </p:nvSpPr>
+            <p:spPr/>
+            <p:txBody>
+              <a:bodyPr/>
+              <a:lstStyle/>
+              <a:p>
+                <a:r>
+                  <a:rPr lang="en-US" dirty="0" smtClean="0"/>
+                  <a:t>Each miner has to be eligible to mint a coin</a:t>
+                </a:r>
+              </a:p>
+              <a:p>
+                <a:pPr lvl="1"/>
+                <a:r>
+                  <a:rPr lang="en-US" dirty="0" smtClean="0"/>
+                  <a:t>Minting </a:t>
+                </a:r>
+                <a:r>
+                  <a:rPr lang="mr-IN" dirty="0" smtClean="0"/>
+                  <a:t>–</a:t>
+                </a:r>
+                <a:r>
+                  <a:rPr lang="en-US" dirty="0" smtClean="0"/>
+                  <a:t> submitting proof of work of a block</a:t>
+                </a:r>
+                <a:endParaRPr lang="en-US" dirty="0"/>
+              </a:p>
+              <a:p>
+                <a:r>
+                  <a:rPr lang="en-US" dirty="0" smtClean="0"/>
+                  <a:t>Eligibility determined by comparing hashes of miners UTXO to the previous blocks hash.</a:t>
+                </a:r>
+              </a:p>
+              <a:p>
+                <a:pPr lvl="1"/>
+                <a:r>
+                  <a:rPr lang="en-US" dirty="0" smtClean="0"/>
+                  <a:t>If the first N bits of the hashes match, the miner is eligible to mint</a:t>
+                </a:r>
+              </a:p>
+              <a:p>
+                <a:pPr lvl="2"/>
+                <a:r>
+                  <a:rPr lang="en-US" dirty="0" smtClean="0"/>
+                  <a:t>If not, miner waits and tries again in 10 seconds. The N value will be lowered by 1 after 10 seconds.</a:t>
+                </a:r>
+              </a:p>
+              <a:p>
+                <a:pPr lvl="2"/>
+                <a:r>
+                  <a:rPr lang="en-US" dirty="0" smtClean="0"/>
+                  <a:t>Means </a:t>
+                </a:r>
+                <a14:m>
+                  <m:oMath xmlns:m="http://schemas.openxmlformats.org/officeDocument/2006/math">
+                    <m:sSup>
+                      <m:sSupPr>
+                        <m:ctrlPr>
+                          <a:rPr lang="en-US" i="1" smtClean="0">
+                            <a:latin typeface="Cambria Math" charset="0"/>
+                          </a:rPr>
+                        </m:ctrlPr>
+                      </m:sSupPr>
+                      <m:e>
+                        <m:r>
+                          <a:rPr lang="en-US" b="0" i="1" smtClean="0">
+                            <a:latin typeface="Cambria Math" charset="0"/>
+                          </a:rPr>
+                          <m:t>2</m:t>
+                        </m:r>
+                      </m:e>
+                      <m:sup>
+                        <m:r>
+                          <a:rPr lang="en-US" b="0" i="1" smtClean="0">
+                            <a:latin typeface="Cambria Math" charset="0"/>
+                          </a:rPr>
+                          <m:t>−</m:t>
+                        </m:r>
+                        <m:r>
+                          <a:rPr lang="en-US" b="0" i="1" smtClean="0">
+                            <a:latin typeface="Cambria Math" charset="0"/>
+                          </a:rPr>
+                          <m:t>𝑁</m:t>
+                        </m:r>
+                      </m:sup>
+                    </m:sSup>
+                  </m:oMath>
+                </a14:m>
+                <a:r>
+                  <a:rPr lang="en-US" dirty="0" smtClean="0"/>
+                  <a:t> of the miners will be able to mine initially on average. This ratio will eventually reach 1 over time, allowing all miners to mint.</a:t>
+                </a:r>
+              </a:p>
+            </p:txBody>
+          </p:sp>
+        </mc:Choice>
+        <mc:Fallback>
+          <p:sp>
+            <p:nvSpPr>
+              <p:cNvPr id="3" name="Content Placeholder 2"/>
+              <p:cNvSpPr>
+                <a:spLocks noGrp="1" noRot="1" noChangeAspect="1" noMove="1" noResize="1" noEditPoints="1" noAdjustHandles="1" noChangeArrowheads="1" noChangeShapeType="1" noTextEdit="1"/>
+              </p:cNvSpPr>
+              <p:nvPr>
+                <p:ph idx="1"/>
+              </p:nvPr>
+            </p:nvSpPr>
+            <p:spPr>
+              <a:blipFill rotWithShape="0">
+                <a:blip r:embed="rId2"/>
+                <a:stretch>
+                  <a:fillRect l="-341" t="-872" r="-341"/>
+                </a:stretch>
+              </a:blipFill>
+            </p:spPr>
+            <p:txBody>
+              <a:bodyPr/>
+              <a:lstStyle/>
+              <a:p>
+                <a:r>
+                  <a:rPr lang="en-US">
+                    <a:noFill/>
+                  </a:rPr>
+                  <a:t> </a:t>
+                </a:r>
+              </a:p>
+            </p:txBody>
+          </p:sp>
+        </mc:Fallback>
+      </mc:AlternateContent>
+    </p:spTree>
+    <p:extLst>
+      <p:ext uri="{BB962C8B-B14F-4D97-AF65-F5344CB8AC3E}">
+        <p14:creationId xmlns:p14="http://schemas.microsoft.com/office/powerpoint/2010/main" val="255467860"/>
+      </p:ext>
+    </p:extLst>
+  </p:cSld>
+  <p:clrMapOvr>
+    <a:masterClrMapping/>
+  </p:clrMapOvr>
+  <p:timing>
+    <p:tnLst>
+      <p:par>
+        <p:cTn id="1" dur="indefinite" restart="never" nodeType="tmRoot"/>
+      </p:par>
+    </p:tnLst>
+  </p:timing>
+</p:sld>
+</file>
+
+<file path=ppt/slides/slide4.xml><?xml version="1.0" encoding="utf-8"?>
+<p:sld xmlns:a="http://schemas.openxmlformats.org/drawingml/2006/main" xmlns:r="http://schemas.openxmlformats.org/officeDocument/2006/relationships" xmlns:p="http://schemas.openxmlformats.org/presentationml/2006/main" showMasterSp="0">
+  <p:cSld>
+    <p:spTree>
+      <p:nvGrpSpPr>
+        <p:cNvPr id="1" name=""/>
+        <p:cNvGrpSpPr/>
+        <p:nvPr/>
+      </p:nvGrpSpPr>
+      <p:grpSpPr>
+        <a:xfrm>
+          <a:off x="0" y="0"/>
+          <a:ext cx="0" cy="0"/>
+          <a:chOff x="0" y="0"/>
+          <a:chExt cx="0" cy="0"/>
+        </a:xfrm>
+      </p:grpSpPr>
+      <p:sp>
+        <p:nvSpPr>
+          <p:cNvPr id="2" name="Title 1"/>
+          <p:cNvSpPr>
+            <a:spLocks noGrp="1"/>
+          </p:cNvSpPr>
+          <p:nvPr>
+            <p:ph type="title"/>
+          </p:nvPr>
+        </p:nvSpPr>
+        <p:spPr/>
+        <p:txBody>
+          <a:bodyPr/>
+          <a:lstStyle/>
+          <a:p>
+            <a:r>
+              <a:rPr lang="en-US" dirty="0" smtClean="0"/>
+              <a:t>Providing Coin-Age</a:t>
+            </a:r>
+            <a:endParaRPr lang="en-US" dirty="0"/>
+          </a:p>
+        </p:txBody>
+      </p:sp>
+      <mc:AlternateContent xmlns:mc="http://schemas.openxmlformats.org/markup-compatibility/2006">
+        <mc:Choice xmlns:a14="http://schemas.microsoft.com/office/drawing/2010/main" Requires="a14">
+          <p:sp>
+            <p:nvSpPr>
+              <p:cNvPr id="3" name="Content Placeholder 2"/>
+              <p:cNvSpPr>
+                <a:spLocks noGrp="1"/>
+              </p:cNvSpPr>
+              <p:nvPr>
+                <p:ph idx="1"/>
+              </p:nvPr>
+            </p:nvSpPr>
+            <p:spPr>
+              <a:xfrm>
+                <a:off x="750627" y="2052918"/>
+                <a:ext cx="10099343" cy="4195481"/>
+              </a:xfrm>
+              <a:noFill/>
+            </p:spPr>
+            <p:txBody>
+              <a:bodyPr>
+                <a:normAutofit/>
+              </a:bodyPr>
+              <a:lstStyle/>
+              <a:p>
+                <a14:m>
+                  <m:oMath xmlns:m="http://schemas.openxmlformats.org/officeDocument/2006/math">
+                    <m:r>
+                      <a:rPr lang="en-US" b="0" i="1" smtClean="0">
+                        <a:latin typeface="Cambria Math" charset="0"/>
+                      </a:rPr>
+                      <m:t>𝐶𝑜𝑖𝑛</m:t>
+                    </m:r>
+                    <m:r>
+                      <a:rPr lang="en-US" b="0" i="1" smtClean="0">
+                        <a:latin typeface="Cambria Math" charset="0"/>
+                      </a:rPr>
+                      <m:t> </m:t>
+                    </m:r>
+                    <m:r>
+                      <a:rPr lang="en-US" b="0" i="1" smtClean="0">
+                        <a:latin typeface="Cambria Math" charset="0"/>
+                      </a:rPr>
+                      <m:t>𝐴𝑔𝑒</m:t>
+                    </m:r>
+                    <m:r>
+                      <a:rPr lang="en-US" b="0" i="1" smtClean="0">
+                        <a:latin typeface="Cambria Math" charset="0"/>
+                      </a:rPr>
+                      <m:t> </m:t>
+                    </m:r>
+                    <m:r>
+                      <a:rPr lang="en-US" b="0" i="1" smtClean="0">
+                        <a:latin typeface="Cambria Math" charset="0"/>
+                      </a:rPr>
+                      <m:t>𝑝𝑒𝑟</m:t>
+                    </m:r>
+                    <m:r>
+                      <a:rPr lang="en-US" b="0" i="1" smtClean="0">
+                        <a:latin typeface="Cambria Math" charset="0"/>
+                      </a:rPr>
+                      <m:t> </m:t>
+                    </m:r>
+                    <m:r>
+                      <a:rPr lang="en-US" b="0" i="1" smtClean="0">
+                        <a:latin typeface="Cambria Math" charset="0"/>
+                      </a:rPr>
+                      <m:t>𝑐𝑜𝑖𝑛</m:t>
+                    </m:r>
+                    <m:r>
+                      <a:rPr lang="en-US" b="0" i="1" smtClean="0">
+                        <a:latin typeface="Cambria Math" charset="0"/>
+                      </a:rPr>
+                      <m:t>=</m:t>
+                    </m:r>
+                    <m:r>
+                      <m:rPr>
+                        <m:nor/>
+                      </m:rPr>
+                      <a:rPr lang="en-US" b="0" i="0" dirty="0" smtClean="0"/>
+                      <m:t>⌊</m:t>
+                    </m:r>
+                    <m:r>
+                      <m:rPr>
+                        <m:sty m:val="p"/>
+                      </m:rPr>
+                      <a:rPr lang="en-US" b="0" i="0" smtClean="0">
+                        <a:latin typeface="Cambria Math" charset="0"/>
+                      </a:rPr>
+                      <m:t>m</m:t>
+                    </m:r>
+                    <m:r>
+                      <a:rPr lang="en-US" b="0" i="1" smtClean="0">
+                        <a:latin typeface="Cambria Math" charset="0"/>
+                      </a:rPr>
+                      <m:t>𝑎𝑥</m:t>
+                    </m:r>
+                    <m:r>
+                      <a:rPr lang="en-US" b="0" i="1" smtClean="0">
+                        <a:latin typeface="Cambria Math" charset="0"/>
+                      </a:rPr>
+                      <m:t>⁡{0,  </m:t>
+                    </m:r>
+                    <m:d>
+                      <m:dPr>
+                        <m:ctrlPr>
+                          <a:rPr lang="en-US" b="0" i="1" smtClean="0">
+                            <a:latin typeface="Cambria Math" charset="0"/>
+                          </a:rPr>
+                        </m:ctrlPr>
+                      </m:dPr>
+                      <m:e>
+                        <m:f>
+                          <m:fPr>
+                            <m:ctrlPr>
+                              <a:rPr lang="en-US" b="0" i="1" smtClean="0">
+                                <a:latin typeface="Cambria Math" charset="0"/>
+                              </a:rPr>
+                            </m:ctrlPr>
+                          </m:fPr>
+                          <m:num>
+                            <m:r>
+                              <a:rPr lang="en-US" b="0" i="1" smtClean="0">
+                                <a:latin typeface="Cambria Math" charset="0"/>
+                              </a:rPr>
+                              <m:t>𝑐𝑜𝑖𝑛𝑉</m:t>
+                            </m:r>
+                            <m:r>
+                              <a:rPr lang="en-US" b="0" i="1" smtClean="0">
+                                <a:latin typeface="Cambria Math" charset="0"/>
+                              </a:rPr>
+                              <m:t>𝑎𝑙𝑢𝑒</m:t>
+                            </m:r>
+                          </m:num>
+                          <m:den>
+                            <m:r>
+                              <a:rPr lang="en-US" b="0" i="1" smtClean="0">
+                                <a:latin typeface="Cambria Math" charset="0"/>
+                              </a:rPr>
+                              <m:t>1000</m:t>
+                            </m:r>
+                          </m:den>
+                        </m:f>
+                      </m:e>
+                    </m:d>
+                    <m:r>
+                      <a:rPr lang="en-US" b="0" i="1" smtClean="0">
+                        <a:latin typeface="Cambria Math" charset="0"/>
+                      </a:rPr>
+                      <m:t>∗(</m:t>
+                    </m:r>
+                    <m:r>
+                      <a:rPr lang="en-US" b="0" i="1" smtClean="0">
+                        <a:latin typeface="Cambria Math" charset="0"/>
+                      </a:rPr>
+                      <m:t>𝑐𝑜𝑖𝑛𝐶h𝑎𝑖𝑛𝐿𝑒𝑣𝑒𝑙</m:t>
+                    </m:r>
+                    <m:r>
+                      <a:rPr lang="en-US" b="0" i="1" smtClean="0">
+                        <a:latin typeface="Cambria Math" charset="0"/>
+                      </a:rPr>
+                      <m:t>−</m:t>
+                    </m:r>
+                    <m:r>
+                      <a:rPr lang="en-US" b="0" i="1" smtClean="0">
+                        <a:latin typeface="Cambria Math" charset="0"/>
+                      </a:rPr>
+                      <m:t>h𝑒𝑎𝑑𝐶h𝑎𝑖𝑛𝐿𝑒𝑣𝑒𝑙</m:t>
+                    </m:r>
+                    <m:r>
+                      <a:rPr lang="en-US" b="0" i="1" smtClean="0">
+                        <a:latin typeface="Cambria Math" charset="0"/>
+                      </a:rPr>
+                      <m:t>−2)}⌋</m:t>
+                    </m:r>
+                  </m:oMath>
+                </a14:m>
+                <a:endParaRPr lang="en-US" dirty="0" smtClean="0"/>
+              </a:p>
+              <a:p>
+                <a14:m>
+                  <m:oMath xmlns:m="http://schemas.openxmlformats.org/officeDocument/2006/math">
+                    <m:r>
+                      <a:rPr lang="en-US" b="0" i="1" smtClean="0">
+                        <a:latin typeface="Cambria Math" charset="0"/>
+                      </a:rPr>
+                      <m:t>𝑇𝑜𝑡𝑎𝑙</m:t>
+                    </m:r>
+                    <m:r>
+                      <a:rPr lang="en-US" b="0" i="1" smtClean="0">
+                        <a:latin typeface="Cambria Math" charset="0"/>
+                      </a:rPr>
+                      <m:t> </m:t>
+                    </m:r>
+                    <m:r>
+                      <a:rPr lang="en-US" b="0" i="1" smtClean="0">
+                        <a:latin typeface="Cambria Math" charset="0"/>
+                      </a:rPr>
+                      <m:t>𝐶𝑜𝑖𝑛𝐴𝑔𝑒</m:t>
+                    </m:r>
+                    <m:r>
+                      <a:rPr lang="en-US" i="1">
+                        <a:latin typeface="Cambria Math" charset="0"/>
+                      </a:rPr>
+                      <m:t>=</m:t>
+                    </m:r>
+                    <m:r>
+                      <m:rPr>
+                        <m:nor/>
+                      </m:rPr>
+                      <a:rPr lang="en-US" dirty="0"/>
+                      <m:t>⌊</m:t>
+                    </m:r>
+                    <m:r>
+                      <m:rPr>
+                        <m:sty m:val="p"/>
+                      </m:rPr>
+                      <a:rPr lang="en-US">
+                        <a:latin typeface="Cambria Math" charset="0"/>
+                      </a:rPr>
+                      <m:t>m</m:t>
+                    </m:r>
+                    <m:r>
+                      <a:rPr lang="en-US" b="0" i="1" smtClean="0">
+                        <a:latin typeface="Cambria Math" charset="0"/>
+                      </a:rPr>
+                      <m:t>𝑖𝑛</m:t>
+                    </m:r>
+                    <m:r>
+                      <a:rPr lang="en-US" i="1">
+                        <a:latin typeface="Cambria Math" charset="0"/>
+                      </a:rPr>
+                      <m:t>⁡{</m:t>
+                    </m:r>
+                    <m:r>
+                      <a:rPr lang="en-US" b="0" i="1" smtClean="0">
+                        <a:latin typeface="Cambria Math" charset="0"/>
+                      </a:rPr>
+                      <m:t>4</m:t>
+                    </m:r>
+                    <m:r>
+                      <a:rPr lang="en-US" i="1">
+                        <a:latin typeface="Cambria Math" charset="0"/>
+                      </a:rPr>
+                      <m:t>,</m:t>
+                    </m:r>
+                    <m:r>
+                      <a:rPr lang="en-US" b="0" i="1" smtClean="0">
+                        <a:latin typeface="Cambria Math" charset="0"/>
+                      </a:rPr>
+                      <m:t>  </m:t>
+                    </m:r>
+                    <m:nary>
+                      <m:naryPr>
+                        <m:chr m:val="∑"/>
+                        <m:subHide m:val="on"/>
+                        <m:supHide m:val="on"/>
+                        <m:ctrlPr>
+                          <a:rPr lang="en-US" b="0" i="1" smtClean="0">
+                            <a:latin typeface="Cambria Math" charset="0"/>
+                          </a:rPr>
+                        </m:ctrlPr>
+                      </m:naryPr>
+                      <m:sub/>
+                      <m:sup/>
+                      <m:e>
+                        <m:r>
+                          <a:rPr lang="en-US" b="0" i="1" smtClean="0">
+                            <a:latin typeface="Cambria Math" charset="0"/>
+                          </a:rPr>
+                          <m:t>𝐼𝑛𝑑𝑖𝑣𝑖𝑑𝑢𝑎𝑙</m:t>
+                        </m:r>
+                        <m:r>
+                          <a:rPr lang="en-US" b="0" i="1" smtClean="0">
+                            <a:latin typeface="Cambria Math" charset="0"/>
+                          </a:rPr>
+                          <m:t> </m:t>
+                        </m:r>
+                        <m:r>
+                          <a:rPr lang="en-US" b="0" i="1" smtClean="0">
+                            <a:latin typeface="Cambria Math" charset="0"/>
+                          </a:rPr>
+                          <m:t>𝑐𝑜𝑖𝑛𝐴𝑔𝑒</m:t>
+                        </m:r>
+                      </m:e>
+                    </m:nary>
+                    <m:r>
+                      <a:rPr lang="en-US" i="1">
+                        <a:latin typeface="Cambria Math" charset="0"/>
+                      </a:rPr>
+                      <m:t>}⌋</m:t>
+                    </m:r>
+                  </m:oMath>
+                </a14:m>
+                <a:endParaRPr lang="en-US" dirty="0" smtClean="0"/>
+              </a:p>
+              <a:p>
+                <a:r>
+                  <a:rPr lang="en-US" dirty="0" smtClean="0"/>
+                  <a:t>Miner creates a coin-age transaction and sends it to self before starting to look for a proof</a:t>
+                </a:r>
+              </a:p>
+              <a:p>
+                <a:pPr lvl="1"/>
+                <a:r>
+                  <a:rPr lang="en-US" dirty="0" smtClean="0"/>
+                  <a:t>This depletes the coin age of the coins picked.</a:t>
+                </a:r>
+              </a:p>
+              <a:p>
+                <a:r>
+                  <a:rPr lang="en-US" dirty="0" smtClean="0"/>
+                  <a:t>The coin-age determines the difficulty of the </a:t>
+                </a:r>
+                <a:r>
+                  <a:rPr lang="en-US" dirty="0" err="1" smtClean="0"/>
+                  <a:t>PoW</a:t>
+                </a:r>
+                <a:r>
+                  <a:rPr lang="en-US" dirty="0" smtClean="0"/>
+                  <a:t>.</a:t>
+                </a:r>
+              </a:p>
+              <a:p>
+                <a:r>
+                  <a:rPr lang="en-US" dirty="0" smtClean="0"/>
+                  <a:t>Coins with chain age of less than 2 will not be used as they don</a:t>
+                </a:r>
+                <a:r>
+                  <a:rPr lang="mr-IN" dirty="0" smtClean="0"/>
+                  <a:t>’</a:t>
+                </a:r>
+                <a:r>
+                  <a:rPr lang="en-US" dirty="0" smtClean="0"/>
+                  <a:t>t contribute to the coin-age value</a:t>
+                </a:r>
+              </a:p>
+              <a:p>
+                <a:pPr lvl="1"/>
+                <a:r>
+                  <a:rPr lang="en-US" dirty="0" smtClean="0"/>
+                  <a:t>Improvement </a:t>
+                </a:r>
+                <a:r>
+                  <a:rPr lang="mr-IN" dirty="0" smtClean="0"/>
+                  <a:t>–</a:t>
+                </a:r>
+                <a:r>
+                  <a:rPr lang="en-US" dirty="0" smtClean="0"/>
+                  <a:t> Only pick enough coins to reach max coin-age</a:t>
+                </a:r>
+                <a:endParaRPr lang="en-US" dirty="0"/>
+              </a:p>
+            </p:txBody>
+          </p:sp>
+        </mc:Choice>
+        <mc:Fallback>
+          <p:sp>
+            <p:nvSpPr>
+              <p:cNvPr id="3" name="Content Placeholder 2"/>
+              <p:cNvSpPr>
+                <a:spLocks noGrp="1" noRot="1" noChangeAspect="1" noMove="1" noResize="1" noEditPoints="1" noAdjustHandles="1" noChangeArrowheads="1" noChangeShapeType="1" noTextEdit="1"/>
+              </p:cNvSpPr>
+              <p:nvPr>
+                <p:ph idx="1"/>
+              </p:nvPr>
+            </p:nvSpPr>
+            <p:spPr>
+              <a:xfrm>
+                <a:off x="750627" y="2052918"/>
+                <a:ext cx="10099343" cy="4195481"/>
+              </a:xfrm>
+              <a:blipFill rotWithShape="0">
+                <a:blip r:embed="rId2"/>
+                <a:stretch>
+                  <a:fillRect l="-241" r="-1267"/>
+                </a:stretch>
+              </a:blipFill>
+            </p:spPr>
+            <p:txBody>
+              <a:bodyPr/>
+              <a:lstStyle/>
+              <a:p>
+                <a:r>
+                  <a:rPr lang="en-US">
+                    <a:noFill/>
+                  </a:rPr>
+                  <a:t> </a:t>
+                </a:r>
+              </a:p>
+            </p:txBody>
+          </p:sp>
+        </mc:Fallback>
+      </mc:AlternateContent>
+    </p:spTree>
+    <p:extLst>
+      <p:ext uri="{BB962C8B-B14F-4D97-AF65-F5344CB8AC3E}">
+        <p14:creationId xmlns:p14="http://schemas.microsoft.com/office/powerpoint/2010/main" val="1229310148"/>
+      </p:ext>
+    </p:extLst>
+  </p:cSld>
+  <p:clrMapOvr>
+    <a:masterClrMapping/>
+  </p:clrMapOvr>
+  <p:timing>
+    <p:tnLst>
+      <p:par>
+        <p:cTn id="1" dur="indefinite" restart="never" nodeType="tmRoot"/>
+      </p:par>
+    </p:tnLst>
+  </p:timing>
+</p:sld>
+</file>
+
+<file path=ppt/slides/slide5.xml><?xml version="1.0" encoding="utf-8"?>
+<p:sld xmlns:a="http://schemas.openxmlformats.org/drawingml/2006/main" xmlns:r="http://schemas.openxmlformats.org/officeDocument/2006/relationships" xmlns:p="http://schemas.openxmlformats.org/presentationml/2006/main" showMasterSp="0">
+  <p:cSld>
+    <p:spTree>
+      <p:nvGrpSpPr>
+        <p:cNvPr id="1" name=""/>
+        <p:cNvGrpSpPr/>
+        <p:nvPr/>
+      </p:nvGrpSpPr>
+      <p:grpSpPr>
+        <a:xfrm>
+          <a:off x="0" y="0"/>
+          <a:ext cx="0" cy="0"/>
+          <a:chOff x="0" y="0"/>
+          <a:chExt cx="0" cy="0"/>
+        </a:xfrm>
+      </p:grpSpPr>
+      <p:pic>
+        <p:nvPicPr>
+          <p:cNvPr id="13" name="Picture 12"/>
+          <p:cNvPicPr>
+            <a:picLocks noChangeAspect="1"/>
+          </p:cNvPicPr>
+          <p:nvPr/>
+        </p:nvPicPr>
+        <p:blipFill>
+          <a:blip r:embed="rId2"/>
+          <a:stretch>
+            <a:fillRect/>
+          </a:stretch>
+        </p:blipFill>
+        <p:spPr>
+          <a:xfrm>
+            <a:off x="2180857" y="2047300"/>
+            <a:ext cx="6089465" cy="4395151"/>
+          </a:xfrm>
+          <a:prstGeom prst="rect">
+            <a:avLst/>
+          </a:prstGeom>
+        </p:spPr>
+      </p:pic>
+      <p:sp>
+        <p:nvSpPr>
+          <p:cNvPr id="2" name="Title 1"/>
+          <p:cNvSpPr>
+            <a:spLocks noGrp="1"/>
+          </p:cNvSpPr>
+          <p:nvPr>
+            <p:ph type="title"/>
+          </p:nvPr>
+        </p:nvSpPr>
+        <p:spPr/>
+        <p:txBody>
+          <a:bodyPr/>
+          <a:lstStyle/>
+          <a:p>
+            <a:r>
+              <a:rPr lang="en-US" dirty="0" smtClean="0"/>
+              <a:t>Coin-Age comparison with different coin amounts</a:t>
+            </a:r>
+            <a:endParaRPr lang="en-US" dirty="0"/>
+          </a:p>
+        </p:txBody>
+      </p:sp>
+      <p:sp>
+        <p:nvSpPr>
+          <p:cNvPr id="7" name="TextBox 6"/>
+          <p:cNvSpPr txBox="1"/>
+          <p:nvPr/>
+        </p:nvSpPr>
+        <p:spPr>
+          <a:xfrm>
+            <a:off x="7059734" y="4728512"/>
+            <a:ext cx="1210588" cy="369332"/>
+          </a:xfrm>
+          <a:prstGeom prst="rect">
+            <a:avLst/>
+          </a:prstGeom>
+          <a:noFill/>
+        </p:spPr>
+        <p:txBody>
+          <a:bodyPr wrap="none" rtlCol="0">
+            <a:spAutoFit/>
+          </a:bodyPr>
+          <a:lstStyle/>
+          <a:p>
+            <a:r>
+              <a:rPr lang="en-US" smtClean="0">
+                <a:solidFill>
+                  <a:schemeClr val="bg1"/>
+                </a:solidFill>
+              </a:rPr>
+              <a:t>100 </a:t>
+            </a:r>
+            <a:r>
+              <a:rPr lang="en-US" dirty="0" smtClean="0">
+                <a:solidFill>
+                  <a:schemeClr val="bg1"/>
+                </a:solidFill>
+              </a:rPr>
+              <a:t>coins</a:t>
+            </a:r>
+            <a:endParaRPr lang="en-US" dirty="0">
+              <a:solidFill>
+                <a:schemeClr val="bg1"/>
+              </a:solidFill>
+            </a:endParaRPr>
+          </a:p>
+        </p:txBody>
+      </p:sp>
+      <p:sp>
+        <p:nvSpPr>
+          <p:cNvPr id="8" name="TextBox 7"/>
+          <p:cNvSpPr txBox="1"/>
+          <p:nvPr/>
+        </p:nvSpPr>
+        <p:spPr>
+          <a:xfrm>
+            <a:off x="3281468" y="3945849"/>
+            <a:ext cx="1338828" cy="369332"/>
+          </a:xfrm>
+          <a:prstGeom prst="rect">
+            <a:avLst/>
+          </a:prstGeom>
+          <a:noFill/>
+        </p:spPr>
+        <p:txBody>
+          <a:bodyPr wrap="none" rtlCol="0">
+            <a:spAutoFit/>
+          </a:bodyPr>
+          <a:lstStyle/>
+          <a:p>
+            <a:r>
+              <a:rPr lang="en-US" dirty="0">
+                <a:solidFill>
+                  <a:schemeClr val="bg1"/>
+                </a:solidFill>
+              </a:rPr>
+              <a:t>2</a:t>
+            </a:r>
+            <a:r>
+              <a:rPr lang="en-US" dirty="0" smtClean="0">
+                <a:solidFill>
+                  <a:schemeClr val="bg1"/>
+                </a:solidFill>
+              </a:rPr>
+              <a:t>000 coins</a:t>
+            </a:r>
+            <a:endParaRPr lang="en-US" dirty="0">
+              <a:solidFill>
+                <a:schemeClr val="bg1"/>
+              </a:solidFill>
+            </a:endParaRPr>
+          </a:p>
+        </p:txBody>
+      </p:sp>
+      <p:sp>
+        <p:nvSpPr>
+          <p:cNvPr id="9" name="TextBox 8"/>
+          <p:cNvSpPr txBox="1"/>
+          <p:nvPr/>
+        </p:nvSpPr>
+        <p:spPr>
+          <a:xfrm>
+            <a:off x="4163953" y="4728512"/>
+            <a:ext cx="1210588" cy="369332"/>
+          </a:xfrm>
+          <a:prstGeom prst="rect">
+            <a:avLst/>
+          </a:prstGeom>
+          <a:noFill/>
+        </p:spPr>
+        <p:txBody>
+          <a:bodyPr wrap="none" rtlCol="0">
+            <a:spAutoFit/>
+          </a:bodyPr>
+          <a:lstStyle/>
+          <a:p>
+            <a:r>
+              <a:rPr lang="en-US" smtClean="0">
+                <a:solidFill>
+                  <a:schemeClr val="bg1"/>
+                </a:solidFill>
+              </a:rPr>
+              <a:t>500 </a:t>
+            </a:r>
+            <a:r>
+              <a:rPr lang="en-US" dirty="0" smtClean="0">
+                <a:solidFill>
+                  <a:schemeClr val="bg1"/>
+                </a:solidFill>
+              </a:rPr>
+              <a:t>coins</a:t>
+            </a:r>
+            <a:endParaRPr lang="en-US" dirty="0">
+              <a:solidFill>
+                <a:schemeClr val="bg1"/>
+              </a:solidFill>
+            </a:endParaRPr>
+          </a:p>
+        </p:txBody>
+      </p:sp>
+      <p:sp>
+        <p:nvSpPr>
+          <p:cNvPr id="10" name="TextBox 9"/>
+          <p:cNvSpPr txBox="1"/>
+          <p:nvPr/>
+        </p:nvSpPr>
+        <p:spPr>
+          <a:xfrm>
+            <a:off x="4535733" y="6073119"/>
+            <a:ext cx="1399742" cy="369332"/>
+          </a:xfrm>
+          <a:prstGeom prst="rect">
+            <a:avLst/>
+          </a:prstGeom>
+          <a:noFill/>
+        </p:spPr>
+        <p:txBody>
+          <a:bodyPr wrap="none" rtlCol="0">
+            <a:spAutoFit/>
+          </a:bodyPr>
+          <a:lstStyle/>
+          <a:p>
+            <a:r>
+              <a:rPr lang="en-US" smtClean="0">
+                <a:solidFill>
+                  <a:schemeClr val="bg1"/>
+                </a:solidFill>
+              </a:rPr>
+              <a:t>Chain Age</a:t>
+            </a:r>
+            <a:endParaRPr lang="en-US" dirty="0">
+              <a:solidFill>
+                <a:schemeClr val="bg1"/>
+              </a:solidFill>
+            </a:endParaRPr>
+          </a:p>
+        </p:txBody>
+      </p:sp>
+      <p:sp>
+        <p:nvSpPr>
+          <p:cNvPr id="11" name="TextBox 10"/>
+          <p:cNvSpPr txBox="1"/>
+          <p:nvPr/>
+        </p:nvSpPr>
+        <p:spPr>
+          <a:xfrm rot="16200000">
+            <a:off x="1763612" y="4102379"/>
+            <a:ext cx="1252266" cy="369332"/>
+          </a:xfrm>
+          <a:prstGeom prst="rect">
+            <a:avLst/>
+          </a:prstGeom>
+          <a:noFill/>
+        </p:spPr>
+        <p:txBody>
+          <a:bodyPr wrap="none" rtlCol="0">
+            <a:spAutoFit/>
+          </a:bodyPr>
+          <a:lstStyle/>
+          <a:p>
+            <a:r>
+              <a:rPr lang="en-US" dirty="0" smtClean="0">
+                <a:solidFill>
+                  <a:schemeClr val="bg1"/>
+                </a:solidFill>
+              </a:rPr>
+              <a:t>Coin Age</a:t>
+            </a:r>
+            <a:endParaRPr lang="en-US" dirty="0">
+              <a:solidFill>
+                <a:schemeClr val="bg1"/>
+              </a:solidFill>
+            </a:endParaRPr>
+          </a:p>
+        </p:txBody>
+      </p:sp>
+    </p:spTree>
+    <p:extLst>
+      <p:ext uri="{BB962C8B-B14F-4D97-AF65-F5344CB8AC3E}">
+        <p14:creationId xmlns:p14="http://schemas.microsoft.com/office/powerpoint/2010/main" val="1077253532"/>
+      </p:ext>
+    </p:extLst>
+  </p:cSld>
+  <p:clrMapOvr>
+    <a:masterClrMapping/>
+  </p:clrMapOvr>
+  <p:timing>
+    <p:tnLst>
+      <p:par>
+        <p:cTn id="1" dur="indefinite" restart="never" nodeType="tmRoot"/>
+      </p:par>
+    </p:tnLst>
+  </p:timing>
+</p:sld>
+</file>
+
+<file path=ppt/slides/slide6.xml><?xml version="1.0" encoding="utf-8"?>
+<p:sld xmlns:a="http://schemas.openxmlformats.org/drawingml/2006/main" xmlns:r="http://schemas.openxmlformats.org/officeDocument/2006/relationships" xmlns:p="http://schemas.openxmlformats.org/presentationml/2006/main" showMasterSp="0">
+  <p:cSld>
+    <p:spTree>
+      <p:nvGrpSpPr>
+        <p:cNvPr id="1" name=""/>
+        <p:cNvGrpSpPr/>
+        <p:nvPr/>
+      </p:nvGrpSpPr>
+      <p:grpSpPr>
+        <a:xfrm>
+          <a:off x="0" y="0"/>
+          <a:ext cx="0" cy="0"/>
+          <a:chOff x="0" y="0"/>
+          <a:chExt cx="0" cy="0"/>
+        </a:xfrm>
+      </p:grpSpPr>
+      <p:sp>
+        <p:nvSpPr>
+          <p:cNvPr id="2" name="Title 1"/>
+          <p:cNvSpPr>
+            <a:spLocks noGrp="1"/>
+          </p:cNvSpPr>
+          <p:nvPr>
+            <p:ph type="title"/>
+          </p:nvPr>
+        </p:nvSpPr>
+        <p:spPr/>
+        <p:txBody>
+          <a:bodyPr/>
+          <a:lstStyle/>
+          <a:p>
+            <a:r>
+              <a:rPr lang="en-US" dirty="0" smtClean="0"/>
+              <a:t>Proof of Work</a:t>
+            </a:r>
+            <a:endParaRPr lang="en-US" dirty="0"/>
+          </a:p>
+        </p:txBody>
+      </p:sp>
+      <p:sp>
+        <p:nvSpPr>
+          <p:cNvPr id="3" name="Content Placeholder 2"/>
+          <p:cNvSpPr>
+            <a:spLocks noGrp="1"/>
+          </p:cNvSpPr>
+          <p:nvPr>
+            <p:ph idx="1"/>
+          </p:nvPr>
+        </p:nvSpPr>
+        <p:spPr>
+          <a:xfrm>
+            <a:off x="1103313" y="2052918"/>
+            <a:ext cx="4819816" cy="4195481"/>
+          </a:xfrm>
+        </p:spPr>
+        <p:txBody>
+          <a:bodyPr>
+            <a:normAutofit lnSpcReduction="10000"/>
+          </a:bodyPr>
+          <a:lstStyle/>
+          <a:p>
+            <a:r>
+              <a:rPr lang="en-US" dirty="0" smtClean="0"/>
+              <a:t>Same concept as Bitcoin</a:t>
+            </a:r>
+          </a:p>
+          <a:p>
+            <a:r>
+              <a:rPr lang="en-US" dirty="0" err="1" smtClean="0"/>
+              <a:t>PoW</a:t>
+            </a:r>
+            <a:r>
+              <a:rPr lang="en-US" dirty="0" smtClean="0"/>
+              <a:t> requirement depends on coin-age of miner.</a:t>
+            </a:r>
+          </a:p>
+          <a:p>
+            <a:pPr lvl="1"/>
+            <a:r>
+              <a:rPr lang="en-US" dirty="0" smtClean="0"/>
+              <a:t>Max difficulty handicap of 1/16</a:t>
+            </a:r>
+            <a:r>
+              <a:rPr lang="en-US" baseline="30000" dirty="0" smtClean="0"/>
+              <a:t>th</a:t>
+            </a:r>
+          </a:p>
+          <a:p>
+            <a:pPr lvl="1"/>
+            <a:r>
+              <a:rPr lang="en-US" dirty="0" smtClean="0"/>
+              <a:t>Allows for users will less computational power to win sometimes</a:t>
+            </a:r>
+          </a:p>
+          <a:p>
+            <a:pPr lvl="1"/>
+            <a:endParaRPr lang="en-US" dirty="0"/>
+          </a:p>
+          <a:p>
+            <a:pPr lvl="1"/>
+            <a:r>
+              <a:rPr lang="en-US" dirty="0" smtClean="0"/>
+              <a:t>Default difficulty for coin age 0 is 20 zeros in hash</a:t>
+            </a:r>
+          </a:p>
+          <a:p>
+            <a:pPr lvl="1"/>
+            <a:r>
+              <a:rPr lang="en-US" dirty="0" smtClean="0"/>
+              <a:t>Difficulty is halved for each coin-age value up to 4.</a:t>
+            </a:r>
+          </a:p>
+          <a:p>
+            <a:endParaRPr lang="en-US" dirty="0"/>
+          </a:p>
+        </p:txBody>
+      </p:sp>
+      <p:pic>
+        <p:nvPicPr>
+          <p:cNvPr id="7" name="Picture 6"/>
+          <p:cNvPicPr>
+            <a:picLocks noChangeAspect="1"/>
+          </p:cNvPicPr>
+          <p:nvPr/>
+        </p:nvPicPr>
+        <p:blipFill>
+          <a:blip r:embed="rId2"/>
+          <a:stretch>
+            <a:fillRect/>
+          </a:stretch>
+        </p:blipFill>
+        <p:spPr>
+          <a:xfrm>
+            <a:off x="6031362" y="1251991"/>
+            <a:ext cx="5432757" cy="5304760"/>
+          </a:xfrm>
+          <a:prstGeom prst="rect">
+            <a:avLst/>
+          </a:prstGeom>
+        </p:spPr>
+      </p:pic>
+      <p:sp>
+        <p:nvSpPr>
+          <p:cNvPr id="8" name="TextBox 7"/>
+          <p:cNvSpPr txBox="1"/>
+          <p:nvPr/>
+        </p:nvSpPr>
+        <p:spPr>
+          <a:xfrm>
+            <a:off x="7770251" y="6248399"/>
+            <a:ext cx="1265090" cy="369332"/>
+          </a:xfrm>
+          <a:prstGeom prst="rect">
+            <a:avLst/>
+          </a:prstGeom>
+          <a:noFill/>
+        </p:spPr>
+        <p:txBody>
+          <a:bodyPr wrap="none" rtlCol="0">
+            <a:spAutoFit/>
+          </a:bodyPr>
+          <a:lstStyle/>
+          <a:p>
+            <a:r>
+              <a:rPr lang="en-US" smtClean="0">
+                <a:solidFill>
+                  <a:schemeClr val="bg1"/>
+                </a:solidFill>
+              </a:rPr>
+              <a:t>Coin-Age</a:t>
+            </a:r>
+            <a:endParaRPr lang="en-US" dirty="0">
+              <a:solidFill>
+                <a:schemeClr val="bg1"/>
+              </a:solidFill>
+            </a:endParaRPr>
+          </a:p>
+        </p:txBody>
+      </p:sp>
+      <p:sp>
+        <p:nvSpPr>
+          <p:cNvPr id="10" name="TextBox 9"/>
+          <p:cNvSpPr txBox="1"/>
+          <p:nvPr/>
+        </p:nvSpPr>
+        <p:spPr>
+          <a:xfrm rot="16200000">
+            <a:off x="5370286" y="4658041"/>
+            <a:ext cx="1691489" cy="369332"/>
+          </a:xfrm>
+          <a:prstGeom prst="rect">
+            <a:avLst/>
+          </a:prstGeom>
+          <a:noFill/>
+        </p:spPr>
+        <p:txBody>
+          <a:bodyPr wrap="none" rtlCol="0">
+            <a:spAutoFit/>
+          </a:bodyPr>
+          <a:lstStyle/>
+          <a:p>
+            <a:r>
+              <a:rPr lang="en-US" dirty="0" err="1" smtClean="0">
+                <a:solidFill>
+                  <a:schemeClr val="bg1"/>
+                </a:solidFill>
+              </a:rPr>
+              <a:t>PoW</a:t>
+            </a:r>
+            <a:r>
+              <a:rPr lang="en-US" dirty="0" smtClean="0">
+                <a:solidFill>
+                  <a:schemeClr val="bg1"/>
+                </a:solidFill>
+              </a:rPr>
+              <a:t> difficulty</a:t>
+            </a:r>
+            <a:endParaRPr lang="en-US" dirty="0">
+              <a:solidFill>
+                <a:schemeClr val="bg1"/>
+              </a:solidFill>
+            </a:endParaRPr>
+          </a:p>
+        </p:txBody>
+      </p:sp>
+    </p:spTree>
+    <p:extLst>
+      <p:ext uri="{BB962C8B-B14F-4D97-AF65-F5344CB8AC3E}">
+        <p14:creationId xmlns:p14="http://schemas.microsoft.com/office/powerpoint/2010/main" val="1191928517"/>
+      </p:ext>
+    </p:extLst>
+  </p:cSld>
+  <p:clrMapOvr>
+    <a:masterClrMapping/>
+  </p:clrMapOvr>
+  <p:timing>
+    <p:tnLst>
+      <p:par>
+        <p:cTn id="1" dur="indefinite" restart="never" nodeType="tmRoot"/>
+      </p:par>
+    </p:tnLst>
+  </p:timing>
+</p:sld>
+</file>
+
+<file path=ppt/slides/slide7.xml><?xml version="1.0" encoding="utf-8"?>
+<p:sld xmlns:a="http://schemas.openxmlformats.org/drawingml/2006/main" xmlns:r="http://schemas.openxmlformats.org/officeDocument/2006/relationships" xmlns:p="http://schemas.openxmlformats.org/presentationml/2006/main" showMasterSp="0">
+  <p:cSld>
+    <p:spTree>
+      <p:nvGrpSpPr>
+        <p:cNvPr id="1" name=""/>
+        <p:cNvGrpSpPr/>
+        <p:nvPr/>
+      </p:nvGrpSpPr>
+      <p:grpSpPr>
+        <a:xfrm>
+          <a:off x="0" y="0"/>
+          <a:ext cx="0" cy="0"/>
+          <a:chOff x="0" y="0"/>
+          <a:chExt cx="0" cy="0"/>
+        </a:xfrm>
+      </p:grpSpPr>
+      <p:sp>
+        <p:nvSpPr>
+          <p:cNvPr id="2" name="Title 1"/>
+          <p:cNvSpPr>
+            <a:spLocks noGrp="1"/>
+          </p:cNvSpPr>
+          <p:nvPr>
+            <p:ph type="title"/>
+          </p:nvPr>
+        </p:nvSpPr>
+        <p:spPr/>
+        <p:txBody>
+          <a:bodyPr/>
+          <a:lstStyle/>
+          <a:p>
+            <a:r>
+              <a:rPr lang="en-US" dirty="0" smtClean="0"/>
+              <a:t>Verifying a proof</a:t>
+            </a:r>
+            <a:endParaRPr lang="en-US" dirty="0"/>
+          </a:p>
+        </p:txBody>
+      </p:sp>
+      <p:sp>
+        <p:nvSpPr>
+          <p:cNvPr id="3" name="Content Placeholder 2"/>
+          <p:cNvSpPr>
+            <a:spLocks noGrp="1"/>
+          </p:cNvSpPr>
+          <p:nvPr>
+            <p:ph idx="1"/>
+          </p:nvPr>
+        </p:nvSpPr>
+        <p:spPr/>
+        <p:txBody>
+          <a:bodyPr/>
+          <a:lstStyle/>
+          <a:p>
+            <a:r>
+              <a:rPr lang="en-US" dirty="0" smtClean="0"/>
+              <a:t>All miners receive:</a:t>
+            </a:r>
+          </a:p>
+          <a:p>
+            <a:pPr lvl="1"/>
+            <a:r>
+              <a:rPr lang="en-US" dirty="0" smtClean="0"/>
+              <a:t>block with proof</a:t>
+            </a:r>
+          </a:p>
+          <a:p>
+            <a:pPr lvl="1"/>
+            <a:r>
+              <a:rPr lang="en-US" dirty="0" smtClean="0"/>
+              <a:t>context of miner</a:t>
+            </a:r>
+          </a:p>
+          <a:p>
+            <a:r>
+              <a:rPr lang="en-US" dirty="0" smtClean="0"/>
+              <a:t>To Verify:</a:t>
+            </a:r>
+          </a:p>
+          <a:p>
+            <a:pPr lvl="1"/>
+            <a:r>
+              <a:rPr lang="en-US" dirty="0" smtClean="0"/>
+              <a:t>Check that the miner is mint eligible by calculating the time difference between the block timestamp and current time.</a:t>
+            </a:r>
+          </a:p>
+          <a:p>
+            <a:pPr lvl="1"/>
+            <a:r>
+              <a:rPr lang="en-US" dirty="0" smtClean="0"/>
+              <a:t>Calculate the target </a:t>
+            </a:r>
+            <a:r>
+              <a:rPr lang="en-US" dirty="0" err="1" smtClean="0"/>
+              <a:t>PoW</a:t>
+            </a:r>
+            <a:r>
+              <a:rPr lang="en-US" dirty="0" smtClean="0"/>
+              <a:t> difficulty based on the coin-age transaction submitted by miner</a:t>
+            </a:r>
+          </a:p>
+          <a:p>
+            <a:pPr lvl="1"/>
+            <a:r>
+              <a:rPr lang="en-US" dirty="0" smtClean="0"/>
+              <a:t>Verify the proof is valid</a:t>
+            </a:r>
+            <a:endParaRPr lang="en-US" dirty="0"/>
+          </a:p>
+        </p:txBody>
+      </p:sp>
+    </p:spTree>
+    <p:extLst>
+      <p:ext uri="{BB962C8B-B14F-4D97-AF65-F5344CB8AC3E}">
+        <p14:creationId xmlns:p14="http://schemas.microsoft.com/office/powerpoint/2010/main" val="1048100941"/>
+      </p:ext>
+    </p:extLst>
+  </p:cSld>
+  <p:clrMapOvr>
+    <a:masterClrMapping/>
+  </p:clrMapOvr>
+  <p:timing>
+    <p:tnLst>
+      <p:par>
+        <p:cTn id="1" dur="indefinite" restart="never" nodeType="tmRoot"/>
+      </p:par>
+    </p:tnLst>
+  </p:timing>
+</p:sld>
+</file>
+
+<file path=ppt/slides/slide8.xml><?xml version="1.0" encoding="utf-8"?>
+<p:sld xmlns:a="http://schemas.openxmlformats.org/drawingml/2006/main" xmlns:r="http://schemas.openxmlformats.org/officeDocument/2006/relationships" xmlns:p="http://schemas.openxmlformats.org/presentationml/2006/main" showMasterSp="0">
+  <p:cSld>
+    <p:spTree>
+      <p:nvGrpSpPr>
+        <p:cNvPr id="1" name=""/>
+        <p:cNvGrpSpPr/>
+        <p:nvPr/>
+      </p:nvGrpSpPr>
+      <p:grpSpPr>
+        <a:xfrm>
+          <a:off x="0" y="0"/>
+          <a:ext cx="0" cy="0"/>
+          <a:chOff x="0" y="0"/>
+          <a:chExt cx="0" cy="0"/>
+        </a:xfrm>
+      </p:grpSpPr>
+      <p:sp>
+        <p:nvSpPr>
+          <p:cNvPr id="2" name="Title 1"/>
+          <p:cNvSpPr>
+            <a:spLocks noGrp="1"/>
+          </p:cNvSpPr>
+          <p:nvPr>
+            <p:ph type="title"/>
+          </p:nvPr>
+        </p:nvSpPr>
+        <p:spPr/>
+        <p:txBody>
+          <a:bodyPr/>
+          <a:lstStyle/>
+          <a:p>
+            <a:r>
+              <a:rPr lang="en-US" dirty="0" smtClean="0"/>
               <a:t>Test results</a:t>
             </a:r>
             <a:endParaRPr lang="en-US" dirty="0"/>
@@ -6202,7 +8166,7 @@
           <p:nvPr>
             <p:extLst>
               <p:ext uri="{D42A27DB-BD31-4B8C-83A1-F6EECF244321}">
-                <p14:modId xmlns:p14="http://schemas.microsoft.com/office/powerpoint/2010/main" val="670254078"/>
+                <p14:modId xmlns:p14="http://schemas.microsoft.com/office/powerpoint/2010/main" val="1300720162"/>
               </p:ext>
             </p:extLst>
           </p:nvPr>
@@ -6215,7 +8179,7 @@
           <a:graphicData uri="http://schemas.openxmlformats.org/drawingml/2006/table">
             <a:tbl>
               <a:tblPr firstRow="1" bandRow="1">
-                <a:tableStyleId>{5C22544A-7EE6-4342-B048-85BDC9FD1C3A}</a:tableStyleId>
+                <a:tableStyleId>{7DF18680-E054-41AD-8BC1-D1AEF772440D}</a:tableStyleId>
               </a:tblPr>
               <a:tblGrid>
                 <a:gridCol w="1652879"/>
@@ -6546,7 +8510,7 @@
           <p:nvPr>
             <p:extLst>
               <p:ext uri="{D42A27DB-BD31-4B8C-83A1-F6EECF244321}">
-                <p14:modId xmlns:p14="http://schemas.microsoft.com/office/powerpoint/2010/main" val="1859085717"/>
+                <p14:modId xmlns:p14="http://schemas.microsoft.com/office/powerpoint/2010/main" val="1578831073"/>
               </p:ext>
             </p:extLst>
           </p:nvPr>
@@ -6559,7 +8523,7 @@
           <a:graphicData uri="http://schemas.openxmlformats.org/drawingml/2006/table">
             <a:tbl>
               <a:tblPr firstRow="1" bandRow="1">
-                <a:tableStyleId>{5C22544A-7EE6-4342-B048-85BDC9FD1C3A}</a:tableStyleId>
+                <a:tableStyleId>{7DF18680-E054-41AD-8BC1-D1AEF772440D}</a:tableStyleId>
               </a:tblPr>
               <a:tblGrid>
                 <a:gridCol w="1666527"/>
@@ -6891,1405 +8855,13 @@
   <p:clrMapOvr>
     <a:masterClrMapping/>
   </p:clrMapOvr>
-</p:sld>
-</file>
-
-<file path=ppt/slides/slide11.xml><?xml version="1.0" encoding="utf-8"?>
-<p:sld xmlns:a="http://schemas.openxmlformats.org/drawingml/2006/main" xmlns:r="http://schemas.openxmlformats.org/officeDocument/2006/relationships" xmlns:p="http://schemas.openxmlformats.org/presentationml/2006/main" showMasterSp="0">
-  <p:cSld>
-    <p:spTree>
-      <p:nvGrpSpPr>
-        <p:cNvPr id="1" name=""/>
-        <p:cNvGrpSpPr/>
-        <p:nvPr/>
-      </p:nvGrpSpPr>
-      <p:grpSpPr>
-        <a:xfrm>
-          <a:off x="0" y="0"/>
-          <a:ext cx="0" cy="0"/>
-          <a:chOff x="0" y="0"/>
-          <a:chExt cx="0" cy="0"/>
-        </a:xfrm>
-      </p:grpSpPr>
-      <p:sp>
-        <p:nvSpPr>
-          <p:cNvPr id="2" name="Title 1"/>
-          <p:cNvSpPr>
-            <a:spLocks noGrp="1"/>
-          </p:cNvSpPr>
-          <p:nvPr>
-            <p:ph type="title"/>
-          </p:nvPr>
-        </p:nvSpPr>
-        <p:spPr/>
-        <p:txBody>
-          <a:bodyPr/>
-          <a:lstStyle/>
-          <a:p>
-            <a:r>
-              <a:rPr lang="en-US" dirty="0" smtClean="0"/>
-              <a:t>Thank you</a:t>
-            </a:r>
-            <a:endParaRPr lang="en-US" dirty="0"/>
-          </a:p>
-        </p:txBody>
-      </p:sp>
-      <p:sp>
-        <p:nvSpPr>
-          <p:cNvPr id="3" name="Content Placeholder 2"/>
-          <p:cNvSpPr>
-            <a:spLocks noGrp="1"/>
-          </p:cNvSpPr>
-          <p:nvPr>
-            <p:ph idx="1"/>
-          </p:nvPr>
-        </p:nvSpPr>
-        <p:spPr/>
-        <p:txBody>
-          <a:bodyPr/>
-          <a:lstStyle/>
-          <a:p>
-            <a:endParaRPr lang="en-US"/>
-          </a:p>
-        </p:txBody>
-      </p:sp>
-    </p:spTree>
-    <p:extLst>
-      <p:ext uri="{BB962C8B-B14F-4D97-AF65-F5344CB8AC3E}">
-        <p14:creationId xmlns:p14="http://schemas.microsoft.com/office/powerpoint/2010/main" val="1257405194"/>
-      </p:ext>
-    </p:extLst>
-  </p:cSld>
-  <p:clrMapOvr>
-    <a:masterClrMapping/>
-  </p:clrMapOvr>
-</p:sld>
-</file>
-
-<file path=ppt/slides/slide2.xml><?xml version="1.0" encoding="utf-8"?>
-<p:sld xmlns:a="http://schemas.openxmlformats.org/drawingml/2006/main" xmlns:r="http://schemas.openxmlformats.org/officeDocument/2006/relationships" xmlns:p="http://schemas.openxmlformats.org/presentationml/2006/main" showMasterSp="0">
-  <p:cSld>
-    <p:spTree>
-      <p:nvGrpSpPr>
-        <p:cNvPr id="1" name=""/>
-        <p:cNvGrpSpPr/>
-        <p:nvPr/>
-      </p:nvGrpSpPr>
-      <p:grpSpPr>
-        <a:xfrm>
-          <a:off x="0" y="0"/>
-          <a:ext cx="0" cy="0"/>
-          <a:chOff x="0" y="0"/>
-          <a:chExt cx="0" cy="0"/>
-        </a:xfrm>
-      </p:grpSpPr>
-      <p:sp>
-        <p:nvSpPr>
-          <p:cNvPr id="2" name="Title 1"/>
-          <p:cNvSpPr>
-            <a:spLocks noGrp="1"/>
-          </p:cNvSpPr>
-          <p:nvPr>
-            <p:ph type="title"/>
-          </p:nvPr>
-        </p:nvSpPr>
-        <p:spPr/>
-        <p:txBody>
-          <a:bodyPr/>
-          <a:lstStyle/>
-          <a:p>
-            <a:r>
-              <a:rPr lang="en-US" dirty="0" smtClean="0"/>
-              <a:t>Idea</a:t>
-            </a:r>
-            <a:endParaRPr lang="en-US" dirty="0"/>
-          </a:p>
-        </p:txBody>
-      </p:sp>
-      <p:sp>
-        <p:nvSpPr>
-          <p:cNvPr id="3" name="Content Placeholder 2"/>
-          <p:cNvSpPr>
-            <a:spLocks noGrp="1"/>
-          </p:cNvSpPr>
-          <p:nvPr>
-            <p:ph idx="1"/>
-          </p:nvPr>
-        </p:nvSpPr>
-        <p:spPr/>
-        <p:txBody>
-          <a:bodyPr/>
-          <a:lstStyle/>
-          <a:p>
-            <a:r>
-              <a:rPr lang="en-US" dirty="0" smtClean="0"/>
-              <a:t>Based on Bitcoin Lite homework project</a:t>
-            </a:r>
-          </a:p>
-          <a:p>
-            <a:r>
-              <a:rPr lang="en-US" dirty="0" smtClean="0"/>
-              <a:t>Add Minting Eligibility - Novelty</a:t>
-            </a:r>
-          </a:p>
-          <a:p>
-            <a:r>
-              <a:rPr lang="en-US" dirty="0" smtClean="0"/>
-              <a:t>Add Coin-Age </a:t>
-            </a:r>
-            <a:r>
-              <a:rPr lang="mr-IN" dirty="0" smtClean="0"/>
-              <a:t>–</a:t>
-            </a:r>
-            <a:r>
-              <a:rPr lang="en-US" dirty="0" smtClean="0"/>
-              <a:t> based on PeerCoin</a:t>
-            </a:r>
-            <a:endParaRPr lang="en-US" dirty="0"/>
-          </a:p>
-        </p:txBody>
-      </p:sp>
-    </p:spTree>
-    <p:extLst>
-      <p:ext uri="{BB962C8B-B14F-4D97-AF65-F5344CB8AC3E}">
-        <p14:creationId xmlns:p14="http://schemas.microsoft.com/office/powerpoint/2010/main" val="777177697"/>
-      </p:ext>
-    </p:extLst>
-  </p:cSld>
-  <p:clrMapOvr>
-    <a:masterClrMapping/>
-  </p:clrMapOvr>
-</p:sld>
-</file>
-
-<file path=ppt/slides/slide3.xml><?xml version="1.0" encoding="utf-8"?>
-<p:sld xmlns:a="http://schemas.openxmlformats.org/drawingml/2006/main" xmlns:r="http://schemas.openxmlformats.org/officeDocument/2006/relationships" xmlns:p="http://schemas.openxmlformats.org/presentationml/2006/main" showMasterSp="0">
-  <p:cSld>
-    <p:spTree>
-      <p:nvGrpSpPr>
-        <p:cNvPr id="1" name=""/>
-        <p:cNvGrpSpPr/>
-        <p:nvPr/>
-      </p:nvGrpSpPr>
-      <p:grpSpPr>
-        <a:xfrm>
-          <a:off x="0" y="0"/>
-          <a:ext cx="0" cy="0"/>
-          <a:chOff x="0" y="0"/>
-          <a:chExt cx="0" cy="0"/>
-        </a:xfrm>
-      </p:grpSpPr>
-      <p:sp>
-        <p:nvSpPr>
-          <p:cNvPr id="2" name="Title 1"/>
-          <p:cNvSpPr>
-            <a:spLocks noGrp="1"/>
-          </p:cNvSpPr>
-          <p:nvPr>
-            <p:ph type="title"/>
-          </p:nvPr>
-        </p:nvSpPr>
-        <p:spPr/>
-        <p:txBody>
-          <a:bodyPr/>
-          <a:lstStyle/>
-          <a:p>
-            <a:r>
-              <a:rPr lang="en-US" dirty="0" smtClean="0"/>
-              <a:t>Minting Eligibility</a:t>
-            </a:r>
-            <a:endParaRPr lang="en-US" dirty="0"/>
-          </a:p>
-        </p:txBody>
-      </p:sp>
-      <mc:AlternateContent xmlns:mc="http://schemas.openxmlformats.org/markup-compatibility/2006">
-        <mc:Choice xmlns:a14="http://schemas.microsoft.com/office/drawing/2010/main" Requires="a14">
-          <p:sp>
-            <p:nvSpPr>
-              <p:cNvPr id="3" name="Content Placeholder 2"/>
-              <p:cNvSpPr>
-                <a:spLocks noGrp="1"/>
-              </p:cNvSpPr>
-              <p:nvPr>
-                <p:ph idx="1"/>
-              </p:nvPr>
-            </p:nvSpPr>
-            <p:spPr/>
-            <p:txBody>
-              <a:bodyPr/>
-              <a:lstStyle/>
-              <a:p>
-                <a:r>
-                  <a:rPr lang="en-US" dirty="0" smtClean="0"/>
-                  <a:t>Each miner has to be eligible to mint a coin</a:t>
-                </a:r>
-              </a:p>
-              <a:p>
-                <a:pPr lvl="1"/>
-                <a:r>
-                  <a:rPr lang="en-US" dirty="0" smtClean="0"/>
-                  <a:t>Minting </a:t>
-                </a:r>
-                <a:r>
-                  <a:rPr lang="mr-IN" dirty="0" smtClean="0"/>
-                  <a:t>–</a:t>
-                </a:r>
-                <a:r>
-                  <a:rPr lang="en-US" dirty="0" smtClean="0"/>
-                  <a:t> submitting proof of work of a block</a:t>
-                </a:r>
-                <a:endParaRPr lang="en-US" dirty="0"/>
-              </a:p>
-              <a:p>
-                <a:r>
-                  <a:rPr lang="en-US" dirty="0" smtClean="0"/>
-                  <a:t>Eligibility determined by comparing hash of all miners UTXO </a:t>
-                </a:r>
-                <a:r>
-                  <a:rPr lang="en-US" smtClean="0"/>
-                  <a:t>hashes concatenated </a:t>
-                </a:r>
-                <a:r>
-                  <a:rPr lang="en-US" dirty="0" err="1" smtClean="0"/>
-                  <a:t>tothe</a:t>
-                </a:r>
-                <a:r>
-                  <a:rPr lang="en-US" dirty="0" smtClean="0"/>
-                  <a:t> previous blocks hash.</a:t>
-                </a:r>
-              </a:p>
-              <a:p>
-                <a:pPr lvl="1"/>
-                <a:r>
-                  <a:rPr lang="en-US" dirty="0" smtClean="0"/>
-                  <a:t>If the first N bits of the hashes match, the miner is eligible to mint</a:t>
-                </a:r>
-              </a:p>
-              <a:p>
-                <a:pPr lvl="2"/>
-                <a:r>
-                  <a:rPr lang="en-US" dirty="0" smtClean="0"/>
-                  <a:t>If not, miner waits and tries again in 10 seconds. The N value will be lowered by 1 after 10 seconds.</a:t>
-                </a:r>
-              </a:p>
-              <a:p>
-                <a:pPr lvl="2"/>
-                <a:r>
-                  <a:rPr lang="en-US" dirty="0" smtClean="0"/>
-                  <a:t>Means </a:t>
-                </a:r>
-                <a14:m>
-                  <m:oMath xmlns:m="http://schemas.openxmlformats.org/officeDocument/2006/math">
-                    <m:sSup>
-                      <m:sSupPr>
-                        <m:ctrlPr>
-                          <a:rPr lang="en-US" i="1" smtClean="0">
-                            <a:latin typeface="Cambria Math" charset="0"/>
-                          </a:rPr>
-                        </m:ctrlPr>
-                      </m:sSupPr>
-                      <m:e>
-                        <m:r>
-                          <a:rPr lang="en-US" b="0" i="1" smtClean="0">
-                            <a:latin typeface="Cambria Math" charset="0"/>
-                          </a:rPr>
-                          <m:t>2</m:t>
-                        </m:r>
-                      </m:e>
-                      <m:sup>
-                        <m:r>
-                          <a:rPr lang="en-US" b="0" i="1" smtClean="0">
-                            <a:latin typeface="Cambria Math" charset="0"/>
-                          </a:rPr>
-                          <m:t>−</m:t>
-                        </m:r>
-                        <m:r>
-                          <a:rPr lang="en-US" b="0" i="1" smtClean="0">
-                            <a:latin typeface="Cambria Math" charset="0"/>
-                          </a:rPr>
-                          <m:t>𝑁</m:t>
-                        </m:r>
-                      </m:sup>
-                    </m:sSup>
-                  </m:oMath>
-                </a14:m>
-                <a:r>
-                  <a:rPr lang="en-US" dirty="0" smtClean="0"/>
-                  <a:t> of the miners will be able to mine initially on average. This ratio will eventually reach 1 over time, allowing all miners to mint.</a:t>
-                </a:r>
-              </a:p>
-            </p:txBody>
-          </p:sp>
-        </mc:Choice>
-        <mc:Fallback>
-          <p:sp>
-            <p:nvSpPr>
-              <p:cNvPr id="3" name="Content Placeholder 2"/>
-              <p:cNvSpPr>
-                <a:spLocks noGrp="1" noRot="1" noChangeAspect="1" noMove="1" noResize="1" noEditPoints="1" noAdjustHandles="1" noChangeArrowheads="1" noChangeShapeType="1" noTextEdit="1"/>
-              </p:cNvSpPr>
-              <p:nvPr>
-                <p:ph idx="1"/>
-              </p:nvPr>
-            </p:nvSpPr>
-            <p:spPr>
-              <a:blipFill rotWithShape="0">
-                <a:blip r:embed="rId2"/>
-                <a:stretch>
-                  <a:fillRect l="-341" t="-872" r="-341"/>
-                </a:stretch>
-              </a:blipFill>
-            </p:spPr>
-            <p:txBody>
-              <a:bodyPr/>
-              <a:lstStyle/>
-              <a:p>
-                <a:r>
-                  <a:rPr lang="en-US">
-                    <a:noFill/>
-                  </a:rPr>
-                  <a:t> </a:t>
-                </a:r>
-              </a:p>
-            </p:txBody>
-          </p:sp>
-        </mc:Fallback>
-      </mc:AlternateContent>
-    </p:spTree>
-    <p:extLst>
-      <p:ext uri="{BB962C8B-B14F-4D97-AF65-F5344CB8AC3E}">
-        <p14:creationId xmlns:p14="http://schemas.microsoft.com/office/powerpoint/2010/main" val="255467860"/>
-      </p:ext>
-    </p:extLst>
-  </p:cSld>
-  <p:clrMapOvr>
-    <a:masterClrMapping/>
-  </p:clrMapOvr>
-</p:sld>
-</file>
-
-<file path=ppt/slides/slide4.xml><?xml version="1.0" encoding="utf-8"?>
-<p:sld xmlns:a="http://schemas.openxmlformats.org/drawingml/2006/main" xmlns:r="http://schemas.openxmlformats.org/officeDocument/2006/relationships" xmlns:p="http://schemas.openxmlformats.org/presentationml/2006/main" showMasterSp="0">
-  <p:cSld>
-    <p:spTree>
-      <p:nvGrpSpPr>
-        <p:cNvPr id="1" name=""/>
-        <p:cNvGrpSpPr/>
-        <p:nvPr/>
-      </p:nvGrpSpPr>
-      <p:grpSpPr>
-        <a:xfrm>
-          <a:off x="0" y="0"/>
-          <a:ext cx="0" cy="0"/>
-          <a:chOff x="0" y="0"/>
-          <a:chExt cx="0" cy="0"/>
-        </a:xfrm>
-      </p:grpSpPr>
-      <p:sp>
-        <p:nvSpPr>
-          <p:cNvPr id="2" name="Title 1"/>
-          <p:cNvSpPr>
-            <a:spLocks noGrp="1"/>
-          </p:cNvSpPr>
-          <p:nvPr>
-            <p:ph type="title"/>
-          </p:nvPr>
-        </p:nvSpPr>
-        <p:spPr/>
-        <p:txBody>
-          <a:bodyPr/>
-          <a:lstStyle/>
-          <a:p>
-            <a:r>
-              <a:rPr lang="en-US" dirty="0" smtClean="0"/>
-              <a:t>Providing Coin-Age</a:t>
-            </a:r>
-            <a:endParaRPr lang="en-US" dirty="0"/>
-          </a:p>
-        </p:txBody>
-      </p:sp>
-      <mc:AlternateContent xmlns:mc="http://schemas.openxmlformats.org/markup-compatibility/2006">
-        <mc:Choice xmlns:a14="http://schemas.microsoft.com/office/drawing/2010/main" Requires="a14">
-          <p:sp>
-            <p:nvSpPr>
-              <p:cNvPr id="3" name="Content Placeholder 2"/>
-              <p:cNvSpPr>
-                <a:spLocks noGrp="1"/>
-              </p:cNvSpPr>
-              <p:nvPr>
-                <p:ph idx="1"/>
-              </p:nvPr>
-            </p:nvSpPr>
-            <p:spPr>
-              <a:xfrm>
-                <a:off x="1103312" y="2052918"/>
-                <a:ext cx="9514646" cy="4195481"/>
-              </a:xfrm>
-              <a:noFill/>
-            </p:spPr>
-            <p:txBody>
-              <a:bodyPr/>
-              <a:lstStyle/>
-              <a:p>
-                <a14:m>
-                  <m:oMath xmlns:m="http://schemas.openxmlformats.org/officeDocument/2006/math">
-                    <m:r>
-                      <a:rPr lang="en-US" b="0" i="1" smtClean="0">
-                        <a:latin typeface="Cambria Math" charset="0"/>
-                      </a:rPr>
-                      <m:t>𝐶𝑜𝑖𝑛</m:t>
-                    </m:r>
-                    <m:r>
-                      <a:rPr lang="en-US" b="0" i="1" smtClean="0">
-                        <a:latin typeface="Cambria Math" charset="0"/>
-                      </a:rPr>
-                      <m:t> </m:t>
-                    </m:r>
-                    <m:r>
-                      <a:rPr lang="en-US" b="0" i="1" smtClean="0">
-                        <a:latin typeface="Cambria Math" charset="0"/>
-                      </a:rPr>
-                      <m:t>𝐴𝑔𝑒</m:t>
-                    </m:r>
-                    <m:r>
-                      <a:rPr lang="en-US" b="0" i="1" smtClean="0">
-                        <a:latin typeface="Cambria Math" charset="0"/>
-                      </a:rPr>
-                      <m:t> </m:t>
-                    </m:r>
-                    <m:r>
-                      <a:rPr lang="en-US" b="0" i="1" smtClean="0">
-                        <a:latin typeface="Cambria Math" charset="0"/>
-                      </a:rPr>
-                      <m:t>𝑉𝑎𝑙𝑢𝑒</m:t>
-                    </m:r>
-                    <m:r>
-                      <a:rPr lang="en-US" b="0" i="1" smtClean="0">
-                        <a:latin typeface="Cambria Math" charset="0"/>
-                      </a:rPr>
-                      <m:t>=</m:t>
-                    </m:r>
-                    <m:r>
-                      <m:rPr>
-                        <m:nor/>
-                      </m:rPr>
-                      <a:rPr lang="en-US" b="0" i="0" dirty="0" smtClean="0"/>
-                      <m:t>⌊</m:t>
-                    </m:r>
-                    <m:r>
-                      <m:rPr>
-                        <m:sty m:val="p"/>
-                      </m:rPr>
-                      <a:rPr lang="en-US" b="0" i="0" smtClean="0">
-                        <a:latin typeface="Cambria Math" charset="0"/>
-                      </a:rPr>
-                      <m:t>min</m:t>
-                    </m:r>
-                    <m:r>
-                      <a:rPr lang="en-US" b="0" i="1" smtClean="0">
-                        <a:latin typeface="Cambria Math" charset="0"/>
-                      </a:rPr>
-                      <m:t>⁡{4,  </m:t>
-                    </m:r>
-                    <m:d>
-                      <m:dPr>
-                        <m:ctrlPr>
-                          <a:rPr lang="en-US" b="0" i="1" smtClean="0">
-                            <a:latin typeface="Cambria Math" charset="0"/>
-                          </a:rPr>
-                        </m:ctrlPr>
-                      </m:dPr>
-                      <m:e>
-                        <m:f>
-                          <m:fPr>
-                            <m:ctrlPr>
-                              <a:rPr lang="en-US" b="0" i="1" smtClean="0">
-                                <a:latin typeface="Cambria Math" charset="0"/>
-                              </a:rPr>
-                            </m:ctrlPr>
-                          </m:fPr>
-                          <m:num>
-                            <m:r>
-                              <a:rPr lang="en-US" b="0" i="1" smtClean="0">
-                                <a:latin typeface="Cambria Math" charset="0"/>
-                              </a:rPr>
-                              <m:t>𝑐𝑜𝑖𝑛𝑉</m:t>
-                            </m:r>
-                            <m:r>
-                              <a:rPr lang="en-US" b="0" i="1" smtClean="0">
-                                <a:latin typeface="Cambria Math" charset="0"/>
-                              </a:rPr>
-                              <m:t>𝑎𝑙𝑢𝑒</m:t>
-                            </m:r>
-                          </m:num>
-                          <m:den>
-                            <m:r>
-                              <a:rPr lang="en-US" b="0" i="1" smtClean="0">
-                                <a:latin typeface="Cambria Math" charset="0"/>
-                              </a:rPr>
-                              <m:t>1000</m:t>
-                            </m:r>
-                          </m:den>
-                        </m:f>
-                      </m:e>
-                    </m:d>
-                    <m:r>
-                      <a:rPr lang="en-US" b="0" i="1" smtClean="0">
-                        <a:latin typeface="Cambria Math" charset="0"/>
-                      </a:rPr>
-                      <m:t>∗(</m:t>
-                    </m:r>
-                    <m:r>
-                      <a:rPr lang="en-US" b="0" i="1" smtClean="0">
-                        <a:latin typeface="Cambria Math" charset="0"/>
-                      </a:rPr>
-                      <m:t>𝑐𝑜𝑖𝑛𝐶h𝑎𝑖𝑛𝐿𝑒𝑣𝑒𝑙</m:t>
-                    </m:r>
-                    <m:r>
-                      <a:rPr lang="en-US" b="0" i="1" smtClean="0">
-                        <a:latin typeface="Cambria Math" charset="0"/>
-                      </a:rPr>
-                      <m:t>−</m:t>
-                    </m:r>
-                    <m:r>
-                      <a:rPr lang="en-US" b="0" i="1" smtClean="0">
-                        <a:latin typeface="Cambria Math" charset="0"/>
-                      </a:rPr>
-                      <m:t>h𝑒𝑎𝑑𝐶h𝑎𝑖𝑛𝐿𝑒𝑣𝑒𝑙</m:t>
-                    </m:r>
-                    <m:r>
-                      <a:rPr lang="en-US" b="0" i="1" smtClean="0">
-                        <a:latin typeface="Cambria Math" charset="0"/>
-                      </a:rPr>
-                      <m:t>)}⌋</m:t>
-                    </m:r>
-                  </m:oMath>
-                </a14:m>
-                <a:endParaRPr lang="en-US" dirty="0" smtClean="0"/>
-              </a:p>
-              <a:p>
-                <a:r>
-                  <a:rPr lang="en-US" dirty="0" smtClean="0"/>
-                  <a:t>Miner creates a coin-age transaction and sends it to self before starting to look for a proof</a:t>
-                </a:r>
-              </a:p>
-              <a:p>
-                <a:pPr lvl="1"/>
-                <a:r>
-                  <a:rPr lang="en-US" dirty="0" smtClean="0"/>
-                  <a:t>This depletes the coin age of the coins picked.</a:t>
-                </a:r>
-              </a:p>
-              <a:p>
-                <a:r>
-                  <a:rPr lang="en-US" dirty="0" smtClean="0"/>
-                  <a:t>The coin-age determines the difficulty of the </a:t>
-                </a:r>
-                <a:r>
-                  <a:rPr lang="en-US" dirty="0" err="1" smtClean="0"/>
-                  <a:t>PoW</a:t>
-                </a:r>
-                <a:r>
-                  <a:rPr lang="en-US" dirty="0" smtClean="0"/>
-                  <a:t>.</a:t>
-                </a:r>
-              </a:p>
-              <a:p>
-                <a:r>
-                  <a:rPr lang="en-US" dirty="0" smtClean="0"/>
-                  <a:t>Coins with same </a:t>
-                </a:r>
-                <a:r>
-                  <a:rPr lang="en-US" dirty="0" err="1" smtClean="0"/>
-                  <a:t>chainLevel</a:t>
-                </a:r>
-                <a:r>
-                  <a:rPr lang="en-US" dirty="0" smtClean="0"/>
-                  <a:t> as head will not be used as they don</a:t>
-                </a:r>
-                <a:r>
-                  <a:rPr lang="mr-IN" dirty="0" smtClean="0"/>
-                  <a:t>’</a:t>
-                </a:r>
-                <a:r>
-                  <a:rPr lang="en-US" dirty="0" smtClean="0"/>
-                  <a:t>t contribute to the coin-age value</a:t>
-                </a:r>
-              </a:p>
-              <a:p>
-                <a:r>
-                  <a:rPr lang="en-US" dirty="0" smtClean="0"/>
-                  <a:t>My implementation picks all coins with at least 1 block layer to them.</a:t>
-                </a:r>
-              </a:p>
-              <a:p>
-                <a:pPr lvl="1"/>
-                <a:r>
-                  <a:rPr lang="en-US" dirty="0" smtClean="0"/>
-                  <a:t>Improvement </a:t>
-                </a:r>
-                <a:r>
-                  <a:rPr lang="mr-IN" dirty="0" smtClean="0"/>
-                  <a:t>–</a:t>
-                </a:r>
-                <a:r>
-                  <a:rPr lang="en-US" dirty="0" smtClean="0"/>
-                  <a:t> Only pick enough coins to reach max coin-age</a:t>
-                </a:r>
-                <a:endParaRPr lang="en-US" dirty="0"/>
-              </a:p>
-            </p:txBody>
-          </p:sp>
-        </mc:Choice>
-        <mc:Fallback>
-          <p:sp>
-            <p:nvSpPr>
-              <p:cNvPr id="3" name="Content Placeholder 2"/>
-              <p:cNvSpPr>
-                <a:spLocks noGrp="1" noRot="1" noChangeAspect="1" noMove="1" noResize="1" noEditPoints="1" noAdjustHandles="1" noChangeArrowheads="1" noChangeShapeType="1" noTextEdit="1"/>
-              </p:cNvSpPr>
-              <p:nvPr>
-                <p:ph idx="1"/>
-              </p:nvPr>
-            </p:nvSpPr>
-            <p:spPr>
-              <a:xfrm>
-                <a:off x="1103312" y="2052918"/>
-                <a:ext cx="9514646" cy="4195481"/>
-              </a:xfrm>
-              <a:blipFill rotWithShape="0">
-                <a:blip r:embed="rId2"/>
-                <a:stretch>
-                  <a:fillRect l="-320"/>
-                </a:stretch>
-              </a:blipFill>
-            </p:spPr>
-            <p:txBody>
-              <a:bodyPr/>
-              <a:lstStyle/>
-              <a:p>
-                <a:r>
-                  <a:rPr lang="en-US">
-                    <a:noFill/>
-                  </a:rPr>
-                  <a:t> </a:t>
-                </a:r>
-              </a:p>
-            </p:txBody>
-          </p:sp>
-        </mc:Fallback>
-      </mc:AlternateContent>
-    </p:spTree>
-    <p:extLst>
-      <p:ext uri="{BB962C8B-B14F-4D97-AF65-F5344CB8AC3E}">
-        <p14:creationId xmlns:p14="http://schemas.microsoft.com/office/powerpoint/2010/main" val="1229310148"/>
-      </p:ext>
-    </p:extLst>
-  </p:cSld>
-  <p:clrMapOvr>
-    <a:masterClrMapping/>
-  </p:clrMapOvr>
-</p:sld>
-</file>
-
-<file path=ppt/slides/slide5.xml><?xml version="1.0" encoding="utf-8"?>
-<p:sld xmlns:a="http://schemas.openxmlformats.org/drawingml/2006/main" xmlns:r="http://schemas.openxmlformats.org/officeDocument/2006/relationships" xmlns:p="http://schemas.openxmlformats.org/presentationml/2006/main" showMasterSp="0">
-  <p:cSld>
-    <p:spTree>
-      <p:nvGrpSpPr>
-        <p:cNvPr id="1" name=""/>
-        <p:cNvGrpSpPr/>
-        <p:nvPr/>
-      </p:nvGrpSpPr>
-      <p:grpSpPr>
-        <a:xfrm>
-          <a:off x="0" y="0"/>
-          <a:ext cx="0" cy="0"/>
-          <a:chOff x="0" y="0"/>
-          <a:chExt cx="0" cy="0"/>
-        </a:xfrm>
-      </p:grpSpPr>
-      <p:sp>
-        <p:nvSpPr>
-          <p:cNvPr id="2" name="Title 1"/>
-          <p:cNvSpPr>
-            <a:spLocks noGrp="1"/>
-          </p:cNvSpPr>
-          <p:nvPr>
-            <p:ph type="title"/>
-          </p:nvPr>
-        </p:nvSpPr>
-        <p:spPr/>
-        <p:txBody>
-          <a:bodyPr/>
-          <a:lstStyle/>
-          <a:p>
-            <a:r>
-              <a:rPr lang="en-US" dirty="0" smtClean="0"/>
-              <a:t>Coin-Age comparison with different coin amounts</a:t>
-            </a:r>
-            <a:endParaRPr lang="en-US" dirty="0"/>
-          </a:p>
-        </p:txBody>
-      </p:sp>
-      <p:pic>
-        <p:nvPicPr>
-          <p:cNvPr id="4" name="Content Placeholder 3"/>
-          <p:cNvPicPr>
-            <a:picLocks noGrp="1" noChangeAspect="1"/>
-          </p:cNvPicPr>
-          <p:nvPr>
-            <p:ph idx="1"/>
-          </p:nvPr>
-        </p:nvPicPr>
-        <p:blipFill>
-          <a:blip r:embed="rId2"/>
-          <a:stretch>
-            <a:fillRect/>
-          </a:stretch>
-        </p:blipFill>
-        <p:spPr>
-          <a:xfrm>
-            <a:off x="2157871" y="2015213"/>
-            <a:ext cx="6704675" cy="4543664"/>
-          </a:xfrm>
-          <a:prstGeom prst="rect">
-            <a:avLst/>
-          </a:prstGeom>
-        </p:spPr>
-      </p:pic>
-      <p:sp>
-        <p:nvSpPr>
-          <p:cNvPr id="7" name="TextBox 6"/>
-          <p:cNvSpPr txBox="1"/>
-          <p:nvPr/>
-        </p:nvSpPr>
-        <p:spPr>
-          <a:xfrm>
-            <a:off x="6372058" y="3289108"/>
-            <a:ext cx="1082348" cy="369332"/>
-          </a:xfrm>
-          <a:prstGeom prst="rect">
-            <a:avLst/>
-          </a:prstGeom>
-          <a:noFill/>
-        </p:spPr>
-        <p:txBody>
-          <a:bodyPr wrap="none" rtlCol="0">
-            <a:spAutoFit/>
-          </a:bodyPr>
-          <a:lstStyle/>
-          <a:p>
-            <a:r>
-              <a:rPr lang="en-US" smtClean="0">
-                <a:solidFill>
-                  <a:schemeClr val="bg1"/>
-                </a:solidFill>
-              </a:rPr>
-              <a:t>50 </a:t>
-            </a:r>
-            <a:r>
-              <a:rPr lang="en-US" dirty="0" smtClean="0">
-                <a:solidFill>
-                  <a:schemeClr val="bg1"/>
-                </a:solidFill>
-              </a:rPr>
-              <a:t>coins</a:t>
-            </a:r>
-            <a:endParaRPr lang="en-US" dirty="0">
-              <a:solidFill>
-                <a:schemeClr val="bg1"/>
-              </a:solidFill>
-            </a:endParaRPr>
-          </a:p>
-        </p:txBody>
-      </p:sp>
-      <p:sp>
-        <p:nvSpPr>
-          <p:cNvPr id="8" name="TextBox 7"/>
-          <p:cNvSpPr txBox="1"/>
-          <p:nvPr/>
-        </p:nvSpPr>
-        <p:spPr>
-          <a:xfrm>
-            <a:off x="3181457" y="3290756"/>
-            <a:ext cx="1210588" cy="369332"/>
-          </a:xfrm>
-          <a:prstGeom prst="rect">
-            <a:avLst/>
-          </a:prstGeom>
-          <a:noFill/>
-        </p:spPr>
-        <p:txBody>
-          <a:bodyPr wrap="none" rtlCol="0">
-            <a:spAutoFit/>
-          </a:bodyPr>
-          <a:lstStyle/>
-          <a:p>
-            <a:r>
-              <a:rPr lang="en-US" dirty="0" smtClean="0">
-                <a:solidFill>
-                  <a:schemeClr val="bg1"/>
-                </a:solidFill>
-              </a:rPr>
-              <a:t>200 coins</a:t>
-            </a:r>
-            <a:endParaRPr lang="en-US" dirty="0">
-              <a:solidFill>
-                <a:schemeClr val="bg1"/>
-              </a:solidFill>
-            </a:endParaRPr>
-          </a:p>
-        </p:txBody>
-      </p:sp>
-      <p:sp>
-        <p:nvSpPr>
-          <p:cNvPr id="9" name="TextBox 8"/>
-          <p:cNvSpPr txBox="1"/>
-          <p:nvPr/>
-        </p:nvSpPr>
-        <p:spPr>
-          <a:xfrm>
-            <a:off x="4620296" y="3289108"/>
-            <a:ext cx="1210588" cy="369332"/>
-          </a:xfrm>
-          <a:prstGeom prst="rect">
-            <a:avLst/>
-          </a:prstGeom>
-          <a:noFill/>
-        </p:spPr>
-        <p:txBody>
-          <a:bodyPr wrap="none" rtlCol="0">
-            <a:spAutoFit/>
-          </a:bodyPr>
-          <a:lstStyle/>
-          <a:p>
-            <a:r>
-              <a:rPr lang="en-US" dirty="0" smtClean="0">
-                <a:solidFill>
-                  <a:schemeClr val="bg1"/>
-                </a:solidFill>
-              </a:rPr>
-              <a:t>100 coins</a:t>
-            </a:r>
-            <a:endParaRPr lang="en-US" dirty="0">
-              <a:solidFill>
-                <a:schemeClr val="bg1"/>
-              </a:solidFill>
-            </a:endParaRPr>
-          </a:p>
-        </p:txBody>
-      </p:sp>
-      <p:sp>
-        <p:nvSpPr>
-          <p:cNvPr id="10" name="TextBox 9"/>
-          <p:cNvSpPr txBox="1"/>
-          <p:nvPr/>
-        </p:nvSpPr>
-        <p:spPr>
-          <a:xfrm>
-            <a:off x="5078114" y="6224792"/>
-            <a:ext cx="1505540" cy="369332"/>
-          </a:xfrm>
-          <a:prstGeom prst="rect">
-            <a:avLst/>
-          </a:prstGeom>
-          <a:noFill/>
-        </p:spPr>
-        <p:txBody>
-          <a:bodyPr wrap="none" rtlCol="0">
-            <a:spAutoFit/>
-          </a:bodyPr>
-          <a:lstStyle/>
-          <a:p>
-            <a:r>
-              <a:rPr lang="en-US" dirty="0" smtClean="0">
-                <a:solidFill>
-                  <a:schemeClr val="bg1"/>
-                </a:solidFill>
-              </a:rPr>
-              <a:t>Chain Level</a:t>
-            </a:r>
-            <a:endParaRPr lang="en-US" dirty="0">
-              <a:solidFill>
-                <a:schemeClr val="bg1"/>
-              </a:solidFill>
-            </a:endParaRPr>
-          </a:p>
-        </p:txBody>
-      </p:sp>
-      <p:sp>
-        <p:nvSpPr>
-          <p:cNvPr id="11" name="TextBox 10"/>
-          <p:cNvSpPr txBox="1"/>
-          <p:nvPr/>
-        </p:nvSpPr>
-        <p:spPr>
-          <a:xfrm rot="16200000">
-            <a:off x="1763612" y="4102379"/>
-            <a:ext cx="1252266" cy="369332"/>
-          </a:xfrm>
-          <a:prstGeom prst="rect">
-            <a:avLst/>
-          </a:prstGeom>
-          <a:noFill/>
-        </p:spPr>
-        <p:txBody>
-          <a:bodyPr wrap="none" rtlCol="0">
-            <a:spAutoFit/>
-          </a:bodyPr>
-          <a:lstStyle/>
-          <a:p>
-            <a:r>
-              <a:rPr lang="en-US" smtClean="0">
-                <a:solidFill>
-                  <a:schemeClr val="bg1"/>
-                </a:solidFill>
-              </a:rPr>
-              <a:t>Coin Age</a:t>
-            </a:r>
-            <a:endParaRPr lang="en-US" dirty="0">
-              <a:solidFill>
-                <a:schemeClr val="bg1"/>
-              </a:solidFill>
-            </a:endParaRPr>
-          </a:p>
-        </p:txBody>
-      </p:sp>
-    </p:spTree>
-    <p:extLst>
-      <p:ext uri="{BB962C8B-B14F-4D97-AF65-F5344CB8AC3E}">
-        <p14:creationId xmlns:p14="http://schemas.microsoft.com/office/powerpoint/2010/main" val="1077253532"/>
-      </p:ext>
-    </p:extLst>
-  </p:cSld>
-  <p:clrMapOvr>
-    <a:masterClrMapping/>
-  </p:clrMapOvr>
-</p:sld>
-</file>
-
-<file path=ppt/slides/slide6.xml><?xml version="1.0" encoding="utf-8"?>
-<p:sld xmlns:a="http://schemas.openxmlformats.org/drawingml/2006/main" xmlns:r="http://schemas.openxmlformats.org/officeDocument/2006/relationships" xmlns:p="http://schemas.openxmlformats.org/presentationml/2006/main" showMasterSp="0">
-  <p:cSld>
-    <p:spTree>
-      <p:nvGrpSpPr>
-        <p:cNvPr id="1" name=""/>
-        <p:cNvGrpSpPr/>
-        <p:nvPr/>
-      </p:nvGrpSpPr>
-      <p:grpSpPr>
-        <a:xfrm>
-          <a:off x="0" y="0"/>
-          <a:ext cx="0" cy="0"/>
-          <a:chOff x="0" y="0"/>
-          <a:chExt cx="0" cy="0"/>
-        </a:xfrm>
-      </p:grpSpPr>
-      <p:sp>
-        <p:nvSpPr>
-          <p:cNvPr id="2" name="Title 1"/>
-          <p:cNvSpPr>
-            <a:spLocks noGrp="1"/>
-          </p:cNvSpPr>
-          <p:nvPr>
-            <p:ph type="title"/>
-          </p:nvPr>
-        </p:nvSpPr>
-        <p:spPr/>
-        <p:txBody>
-          <a:bodyPr/>
-          <a:lstStyle/>
-          <a:p>
-            <a:r>
-              <a:rPr lang="en-US" dirty="0" smtClean="0"/>
-              <a:t>Proof of Work</a:t>
-            </a:r>
-            <a:endParaRPr lang="en-US" dirty="0"/>
-          </a:p>
-        </p:txBody>
-      </p:sp>
-      <p:sp>
-        <p:nvSpPr>
-          <p:cNvPr id="3" name="Content Placeholder 2"/>
-          <p:cNvSpPr>
-            <a:spLocks noGrp="1"/>
-          </p:cNvSpPr>
-          <p:nvPr>
-            <p:ph idx="1"/>
-          </p:nvPr>
-        </p:nvSpPr>
-        <p:spPr>
-          <a:xfrm>
-            <a:off x="1103313" y="2052918"/>
-            <a:ext cx="4819816" cy="4195481"/>
-          </a:xfrm>
-        </p:spPr>
-        <p:txBody>
-          <a:bodyPr>
-            <a:normAutofit lnSpcReduction="10000"/>
-          </a:bodyPr>
-          <a:lstStyle/>
-          <a:p>
-            <a:r>
-              <a:rPr lang="en-US" dirty="0" smtClean="0"/>
-              <a:t>Same concept as Bitcoin</a:t>
-            </a:r>
-          </a:p>
-          <a:p>
-            <a:r>
-              <a:rPr lang="en-US" dirty="0" err="1" smtClean="0"/>
-              <a:t>PoW</a:t>
-            </a:r>
-            <a:r>
-              <a:rPr lang="en-US" dirty="0" smtClean="0"/>
-              <a:t> requirement depends on coin-age of miner.</a:t>
-            </a:r>
-          </a:p>
-          <a:p>
-            <a:pPr lvl="1"/>
-            <a:r>
-              <a:rPr lang="en-US" dirty="0" smtClean="0"/>
-              <a:t>Max difficulty handicap of 1/16</a:t>
-            </a:r>
-            <a:r>
-              <a:rPr lang="en-US" baseline="30000" dirty="0" smtClean="0"/>
-              <a:t>th</a:t>
-            </a:r>
-          </a:p>
-          <a:p>
-            <a:pPr lvl="1"/>
-            <a:r>
-              <a:rPr lang="en-US" dirty="0" smtClean="0"/>
-              <a:t>Allows for users will less computational power to win sometimes</a:t>
-            </a:r>
-          </a:p>
-          <a:p>
-            <a:pPr lvl="1"/>
-            <a:endParaRPr lang="en-US" dirty="0"/>
-          </a:p>
-          <a:p>
-            <a:pPr lvl="1"/>
-            <a:r>
-              <a:rPr lang="en-US" dirty="0" smtClean="0"/>
-              <a:t>Default difficulty for coin age 0 is 20 zeros in hash</a:t>
-            </a:r>
-          </a:p>
-          <a:p>
-            <a:pPr lvl="1"/>
-            <a:r>
-              <a:rPr lang="en-US" dirty="0" smtClean="0"/>
-              <a:t>Difficulty is halved for each coin-age value up to 4.</a:t>
-            </a:r>
-          </a:p>
-          <a:p>
-            <a:endParaRPr lang="en-US" dirty="0"/>
-          </a:p>
-        </p:txBody>
-      </p:sp>
-      <p:pic>
-        <p:nvPicPr>
-          <p:cNvPr id="7" name="Picture 6"/>
-          <p:cNvPicPr>
-            <a:picLocks noChangeAspect="1"/>
-          </p:cNvPicPr>
-          <p:nvPr/>
-        </p:nvPicPr>
-        <p:blipFill>
-          <a:blip r:embed="rId2"/>
-          <a:stretch>
-            <a:fillRect/>
-          </a:stretch>
-        </p:blipFill>
-        <p:spPr>
-          <a:xfrm>
-            <a:off x="6413500" y="1782108"/>
-            <a:ext cx="4851400" cy="4737100"/>
-          </a:xfrm>
-          <a:prstGeom prst="rect">
-            <a:avLst/>
-          </a:prstGeom>
-        </p:spPr>
-      </p:pic>
-    </p:spTree>
-    <p:extLst>
-      <p:ext uri="{BB962C8B-B14F-4D97-AF65-F5344CB8AC3E}">
-        <p14:creationId xmlns:p14="http://schemas.microsoft.com/office/powerpoint/2010/main" val="1191928517"/>
-      </p:ext>
-    </p:extLst>
-  </p:cSld>
-  <p:clrMapOvr>
-    <a:masterClrMapping/>
-  </p:clrMapOvr>
-</p:sld>
-</file>
-
-<file path=ppt/slides/slide7.xml><?xml version="1.0" encoding="utf-8"?>
-<p:sld xmlns:a="http://schemas.openxmlformats.org/drawingml/2006/main" xmlns:r="http://schemas.openxmlformats.org/officeDocument/2006/relationships" xmlns:p="http://schemas.openxmlformats.org/presentationml/2006/main" showMasterSp="0">
-  <p:cSld>
-    <p:spTree>
-      <p:nvGrpSpPr>
-        <p:cNvPr id="1" name=""/>
-        <p:cNvGrpSpPr/>
-        <p:nvPr/>
-      </p:nvGrpSpPr>
-      <p:grpSpPr>
-        <a:xfrm>
-          <a:off x="0" y="0"/>
-          <a:ext cx="0" cy="0"/>
-          <a:chOff x="0" y="0"/>
-          <a:chExt cx="0" cy="0"/>
-        </a:xfrm>
-      </p:grpSpPr>
-      <p:sp>
-        <p:nvSpPr>
-          <p:cNvPr id="2" name="Title 1"/>
-          <p:cNvSpPr>
-            <a:spLocks noGrp="1"/>
-          </p:cNvSpPr>
-          <p:nvPr>
-            <p:ph type="title"/>
-          </p:nvPr>
-        </p:nvSpPr>
-        <p:spPr/>
-        <p:txBody>
-          <a:bodyPr/>
-          <a:lstStyle/>
-          <a:p>
-            <a:r>
-              <a:rPr lang="en-US" dirty="0" smtClean="0"/>
-              <a:t>Verifying a proof</a:t>
-            </a:r>
-            <a:endParaRPr lang="en-US" dirty="0"/>
-          </a:p>
-        </p:txBody>
-      </p:sp>
-      <p:sp>
-        <p:nvSpPr>
-          <p:cNvPr id="3" name="Content Placeholder 2"/>
-          <p:cNvSpPr>
-            <a:spLocks noGrp="1"/>
-          </p:cNvSpPr>
-          <p:nvPr>
-            <p:ph idx="1"/>
-          </p:nvPr>
-        </p:nvSpPr>
-        <p:spPr/>
-        <p:txBody>
-          <a:bodyPr/>
-          <a:lstStyle/>
-          <a:p>
-            <a:r>
-              <a:rPr lang="en-US" dirty="0" smtClean="0"/>
-              <a:t>All miners receive:</a:t>
-            </a:r>
-          </a:p>
-          <a:p>
-            <a:pPr lvl="1"/>
-            <a:r>
-              <a:rPr lang="en-US" dirty="0" smtClean="0"/>
-              <a:t>block with proof</a:t>
-            </a:r>
-          </a:p>
-          <a:p>
-            <a:pPr lvl="1"/>
-            <a:r>
-              <a:rPr lang="en-US" dirty="0" smtClean="0"/>
-              <a:t>context of miner</a:t>
-            </a:r>
-          </a:p>
-          <a:p>
-            <a:r>
-              <a:rPr lang="en-US" dirty="0" smtClean="0"/>
-              <a:t>To Verify:</a:t>
-            </a:r>
-          </a:p>
-          <a:p>
-            <a:pPr lvl="1"/>
-            <a:r>
-              <a:rPr lang="en-US" dirty="0" smtClean="0"/>
-              <a:t>Check that the miner is mint eligible by calculating the time difference between the block timestamp and current time.</a:t>
-            </a:r>
-          </a:p>
-          <a:p>
-            <a:pPr lvl="1"/>
-            <a:r>
-              <a:rPr lang="en-US" dirty="0" smtClean="0"/>
-              <a:t>Calculate the target </a:t>
-            </a:r>
-            <a:r>
-              <a:rPr lang="en-US" dirty="0" err="1" smtClean="0"/>
-              <a:t>PoW</a:t>
-            </a:r>
-            <a:r>
-              <a:rPr lang="en-US" dirty="0" smtClean="0"/>
-              <a:t> difficulty based on the coin-age transaction submitted by miner</a:t>
-            </a:r>
-          </a:p>
-          <a:p>
-            <a:pPr lvl="1"/>
-            <a:r>
-              <a:rPr lang="en-US" dirty="0" smtClean="0"/>
-              <a:t>Verify the proof is valid</a:t>
-            </a:r>
-            <a:endParaRPr lang="en-US" dirty="0"/>
-          </a:p>
-        </p:txBody>
-      </p:sp>
-    </p:spTree>
-    <p:extLst>
-      <p:ext uri="{BB962C8B-B14F-4D97-AF65-F5344CB8AC3E}">
-        <p14:creationId xmlns:p14="http://schemas.microsoft.com/office/powerpoint/2010/main" val="1048100941"/>
-      </p:ext>
-    </p:extLst>
-  </p:cSld>
-  <p:clrMapOvr>
-    <a:masterClrMapping/>
-  </p:clrMapOvr>
-</p:sld>
-</file>
-
-<file path=ppt/slides/slide8.xml><?xml version="1.0" encoding="utf-8"?>
-<p:sld xmlns:a="http://schemas.openxmlformats.org/drawingml/2006/main" xmlns:r="http://schemas.openxmlformats.org/officeDocument/2006/relationships" xmlns:p="http://schemas.openxmlformats.org/presentationml/2006/main" showMasterSp="0">
-  <p:cSld>
-    <p:spTree>
-      <p:nvGrpSpPr>
-        <p:cNvPr id="1" name=""/>
-        <p:cNvGrpSpPr/>
-        <p:nvPr/>
-      </p:nvGrpSpPr>
-      <p:grpSpPr>
-        <a:xfrm>
-          <a:off x="0" y="0"/>
-          <a:ext cx="0" cy="0"/>
-          <a:chOff x="0" y="0"/>
-          <a:chExt cx="0" cy="0"/>
-        </a:xfrm>
-      </p:grpSpPr>
-      <p:sp>
-        <p:nvSpPr>
-          <p:cNvPr id="2" name="Title 1"/>
-          <p:cNvSpPr>
-            <a:spLocks noGrp="1"/>
-          </p:cNvSpPr>
-          <p:nvPr>
-            <p:ph type="title"/>
-          </p:nvPr>
-        </p:nvSpPr>
-        <p:spPr/>
-        <p:txBody>
-          <a:bodyPr/>
-          <a:lstStyle/>
-          <a:p>
-            <a:r>
-              <a:rPr lang="en-US" dirty="0" smtClean="0"/>
-              <a:t>Difficulties experienced</a:t>
-            </a:r>
-            <a:endParaRPr lang="en-US" dirty="0"/>
-          </a:p>
-        </p:txBody>
-      </p:sp>
-      <p:sp>
-        <p:nvSpPr>
-          <p:cNvPr id="3" name="Content Placeholder 2"/>
-          <p:cNvSpPr>
-            <a:spLocks noGrp="1"/>
-          </p:cNvSpPr>
-          <p:nvPr>
-            <p:ph idx="1"/>
-          </p:nvPr>
-        </p:nvSpPr>
-        <p:spPr/>
-        <p:txBody>
-          <a:bodyPr/>
-          <a:lstStyle/>
-          <a:p>
-            <a:r>
-              <a:rPr lang="en-US" dirty="0" smtClean="0"/>
-              <a:t>Project based on BCL</a:t>
-            </a:r>
-          </a:p>
-          <a:p>
-            <a:pPr lvl="1"/>
-            <a:r>
-              <a:rPr lang="en-US" dirty="0" smtClean="0"/>
-              <a:t>Wallet is separate from </a:t>
-            </a:r>
-            <a:r>
-              <a:rPr lang="en-US" dirty="0" err="1" smtClean="0"/>
-              <a:t>blockchain</a:t>
-            </a:r>
-            <a:r>
-              <a:rPr lang="en-US" dirty="0" smtClean="0"/>
-              <a:t> </a:t>
-            </a:r>
-            <a:r>
-              <a:rPr lang="mr-IN" dirty="0" smtClean="0"/>
-              <a:t>–</a:t>
-            </a:r>
-            <a:r>
-              <a:rPr lang="en-US" dirty="0" smtClean="0"/>
-              <a:t> No way to only spend coin-age for successful blocks mined</a:t>
-            </a:r>
-          </a:p>
-          <a:p>
-            <a:pPr lvl="2"/>
-            <a:r>
-              <a:rPr lang="en-US" dirty="0" smtClean="0"/>
-              <a:t>Have to rewrite the wallet/transaction code</a:t>
-            </a:r>
-          </a:p>
-          <a:p>
-            <a:pPr lvl="2"/>
-            <a:r>
-              <a:rPr lang="en-US" dirty="0" smtClean="0"/>
-              <a:t>Revert any transaction in wallet for miners that didn’t win</a:t>
-            </a:r>
-          </a:p>
-          <a:p>
-            <a:pPr lvl="1"/>
-            <a:r>
-              <a:rPr lang="en-US" dirty="0" smtClean="0"/>
-              <a:t>Clients should also have access and knowledge of chain</a:t>
-            </a:r>
-          </a:p>
-          <a:p>
-            <a:pPr lvl="1"/>
-            <a:r>
-              <a:rPr lang="en-US" dirty="0" smtClean="0"/>
-              <a:t>Implementing minting eligibility</a:t>
-            </a:r>
-          </a:p>
-          <a:p>
-            <a:pPr lvl="2"/>
-            <a:r>
-              <a:rPr lang="en-US" dirty="0" smtClean="0"/>
-              <a:t>Miners should only start mining when eligible</a:t>
-            </a:r>
-          </a:p>
-          <a:p>
-            <a:pPr lvl="2"/>
-            <a:r>
-              <a:rPr lang="en-US" dirty="0" smtClean="0"/>
-              <a:t>Miners have to verify other miners block and eligibility based on timestamps</a:t>
-            </a:r>
-          </a:p>
-          <a:p>
-            <a:pPr lvl="2"/>
-            <a:endParaRPr lang="en-US" dirty="0"/>
-          </a:p>
-        </p:txBody>
-      </p:sp>
-    </p:spTree>
-    <p:extLst>
-      <p:ext uri="{BB962C8B-B14F-4D97-AF65-F5344CB8AC3E}">
-        <p14:creationId xmlns:p14="http://schemas.microsoft.com/office/powerpoint/2010/main" val="1093880317"/>
-      </p:ext>
-    </p:extLst>
-  </p:cSld>
-  <p:clrMapOvr>
-    <a:masterClrMapping/>
-  </p:clrMapOvr>
+  <p:timing>
+    <p:tnLst>
+      <p:par>
+        <p:cTn id="1" dur="indefinite" restart="never" nodeType="tmRoot"/>
+      </p:par>
+    </p:tnLst>
+  </p:timing>
 </p:sld>
 </file>
 
@@ -8327,7 +8899,7 @@
           <a:p>
             <a:r>
               <a:rPr lang="en-US" dirty="0" smtClean="0"/>
-              <a:t>Things ignored in implementation</a:t>
+              <a:t>Difficulties experienced</a:t>
             </a:r>
             <a:endParaRPr lang="en-US" dirty="0"/>
           </a:p>
@@ -8350,22 +8922,90 @@
           <a:p>
             <a:r>
               <a:rPr lang="en-US" dirty="0" smtClean="0"/>
-              <a:t>I trust the block timestamp</a:t>
-            </a:r>
-            <a:endParaRPr lang="en-US" dirty="0"/>
+              <a:t>Wallet is separate from </a:t>
+            </a:r>
+            <a:r>
+              <a:rPr lang="en-US" dirty="0" err="1" smtClean="0"/>
+              <a:t>blockchain</a:t>
+            </a:r>
+            <a:r>
+              <a:rPr lang="en-US" dirty="0" smtClean="0"/>
+              <a:t> </a:t>
+            </a:r>
+            <a:r>
+              <a:rPr lang="mr-IN" dirty="0" smtClean="0"/>
+              <a:t>–</a:t>
+            </a:r>
+            <a:r>
+              <a:rPr lang="en-US" dirty="0" smtClean="0"/>
+              <a:t> Difficult for miner to spend their coins only if their block wins..</a:t>
+            </a:r>
+          </a:p>
+          <a:p>
+            <a:pPr lvl="1"/>
+            <a:r>
+              <a:rPr lang="en-US" dirty="0" smtClean="0"/>
+              <a:t>Any transactions not in chain is not valid.</a:t>
+            </a:r>
+          </a:p>
+          <a:p>
+            <a:pPr lvl="1"/>
+            <a:r>
+              <a:rPr lang="en-US" dirty="0" smtClean="0"/>
+              <a:t>Make wallet just a bunch of keys. Retrieve all info about coin from block.</a:t>
+            </a:r>
+          </a:p>
+          <a:p>
+            <a:pPr lvl="2"/>
+            <a:r>
+              <a:rPr lang="en-US" dirty="0" smtClean="0"/>
+              <a:t>Requires access to the block. Only miners have the block history. Not ideal</a:t>
+            </a:r>
+            <a:r>
+              <a:rPr lang="mr-IN" dirty="0" smtClean="0"/>
+              <a:t>…</a:t>
+            </a:r>
+            <a:endParaRPr lang="en-US" dirty="0" smtClean="0"/>
+          </a:p>
+          <a:p>
+            <a:r>
+              <a:rPr lang="en-US" dirty="0" smtClean="0"/>
+              <a:t>Implementing minting eligibility</a:t>
+            </a:r>
+          </a:p>
+          <a:p>
+            <a:pPr lvl="1"/>
+            <a:r>
+              <a:rPr lang="en-US" dirty="0" smtClean="0"/>
+              <a:t>Miners should only start mining when eligible</a:t>
+            </a:r>
+          </a:p>
+          <a:p>
+            <a:pPr lvl="1"/>
+            <a:r>
+              <a:rPr lang="en-US" dirty="0" smtClean="0"/>
+              <a:t>Miners have to verify other miners block and eligibility based on timestamps</a:t>
+            </a:r>
           </a:p>
         </p:txBody>
       </p:sp>
     </p:spTree>
     <p:extLst>
       <p:ext uri="{BB962C8B-B14F-4D97-AF65-F5344CB8AC3E}">
-        <p14:creationId xmlns:p14="http://schemas.microsoft.com/office/powerpoint/2010/main" val="1530685769"/>
+        <p14:creationId xmlns:p14="http://schemas.microsoft.com/office/powerpoint/2010/main" val="1093880317"/>
       </p:ext>
     </p:extLst>
   </p:cSld>
   <p:clrMapOvr>
     <a:masterClrMapping/>
   </p:clrMapOvr>
+  <p:timing>
+    <p:tnLst>
+      <p:par>
+        <p:cTn id="1" dur="indefinite" restart="never" nodeType="tmRoot"/>
+      </p:par>
+    </p:tnLst>
+  </p:timing>
 </p:sld>
 </file>
 
@@ -8633,4 +9273,265 @@
     </a:ext>
   </a:extLst>
 </a:theme>
+</file>
+
+<file path=ppt/theme/theme2.xml><?xml version="1.0" encoding="utf-8"?>
+<a:theme xmlns:a="http://schemas.openxmlformats.org/drawingml/2006/main" name="Office Theme">
+  <a:themeElements>
+    <a:clrScheme name="Office">
+      <a:dk1>
+        <a:sysClr val="windowText" lastClr="000000"/>
+      </a:dk1>
+      <a:lt1>
+        <a:sysClr val="window" lastClr="FFFFFF"/>
+      </a:lt1>
+      <a:dk2>
+        <a:srgbClr val="44546A"/>
+      </a:dk2>
+      <a:lt2>
+        <a:srgbClr val="E7E6E6"/>
+      </a:lt2>
+      <a:accent1>
+        <a:srgbClr val="4472C4"/>
+      </a:accent1>
+      <a:accent2>
+        <a:srgbClr val="ED7D31"/>
+      </a:accent2>
+      <a:accent3>
+        <a:srgbClr val="A5A5A5"/>
+      </a:accent3>
+      <a:accent4>
+        <a:srgbClr val="FFC000"/>
+      </a:accent4>
+      <a:accent5>
+        <a:srgbClr val="5B9BD5"/>
+      </a:accent5>
+      <a:accent6>
+        <a:srgbClr val="70AD47"/>
+      </a:accent6>
+      <a:hlink>
+        <a:srgbClr val="0563C1"/>
+      </a:hlink>
+      <a:folHlink>
+        <a:srgbClr val="954F72"/>
+      </a:folHlink>
+    </a:clrScheme>
+    <a:fontScheme name="Office">
+      <a:majorFont>
+        <a:latin typeface="Calibri Light" panose="020F0302020204030204"/>
+        <a:ea typeface=""/>
+        <a:cs typeface=""/>
+        <a:font script="Jpan" typeface="Yu Gothic Light"/>
+        <a:font script="Hang" typeface="맑은 고딕"/>
+        <a:font script="Hans" typeface="DengXian Light"/>
+        <a:font script="Hant" typeface="新細明體"/>
+        <a:font script="Arab" typeface="Times New Roman"/>
+        <a:font script="Hebr" typeface="Times New Roman"/>
+        <a:font script="Thai" typeface="Angsana New"/>
+        <a:font script="Ethi" typeface="Nyala"/>
+        <a:font script="Beng" typeface="Vrinda"/>
+        <a:font script="Gujr" typeface="Shruti"/>
+        <a:font script="Khmr" typeface="MoolBoran"/>
+        <a:font script="Knda" typeface="Tunga"/>
+        <a:font script="Guru" typeface="Raavi"/>
+        <a:font script="Cans" typeface="Euphemia"/>
+        <a:font script="Cher" typeface="Plantagenet Cherokee"/>
+        <a:font script="Yiii" typeface="Microsoft Yi Baiti"/>
+        <a:font script="Tibt" typeface="Microsoft Himalaya"/>
+        <a:font script="Thaa" typeface="MV Boli"/>
+        <a:font script="Deva" typeface="Mangal"/>
+        <a:font script="Telu" typeface="Gautami"/>
+        <a:font script="Taml" typeface="Latha"/>
+        <a:font script="Syrc" typeface="Estrangelo Edessa"/>
+        <a:font script="Orya" typeface="Kalinga"/>
+        <a:font script="Mlym" typeface="Kartika"/>
+        <a:font script="Laoo" typeface="DokChampa"/>
+        <a:font script="Sinh" typeface="Iskoola Pota"/>
+        <a:font script="Mong" typeface="Mongolian Baiti"/>
+        <a:font script="Viet" typeface="Times New Roman"/>
+        <a:font script="Uigh" typeface="Microsoft Uighur"/>
+        <a:font script="Geor" typeface="Sylfaen"/>
+      </a:majorFont>
+      <a:minorFont>
+        <a:latin typeface="Calibri" panose="020F0502020204030204"/>
+        <a:ea typeface=""/>
+        <a:cs typeface=""/>
+        <a:font script="Jpan" typeface="Yu Gothic"/>
+        <a:font script="Hang" typeface="맑은 고딕"/>
+        <a:font script="Hans" typeface="DengXian"/>
+        <a:font script="Hant" typeface="新細明體"/>
+        <a:font script="Arab" typeface="Arial"/>
+        <a:font script="Hebr" typeface="Arial"/>
+        <a:font script="Thai" typeface="Cordia New"/>
+        <a:font script="Ethi" typeface="Nyala"/>
+        <a:font script="Beng" typeface="Vrinda"/>
+        <a:font script="Gujr" typeface="Shruti"/>
+        <a:font script="Khmr" typeface="DaunPenh"/>
+        <a:font script="Knda" typeface="Tunga"/>
+        <a:font script="Guru" typeface="Raavi"/>
+        <a:font script="Cans" typeface="Euphemia"/>
+        <a:font script="Cher" typeface="Plantagenet Cherokee"/>
+        <a:font script="Yiii" typeface="Microsoft Yi Baiti"/>
+        <a:font script="Tibt" typeface="Microsoft Himalaya"/>
+        <a:font script="Thaa" typeface="MV Boli"/>
+        <a:font script="Deva" typeface="Mangal"/>
+        <a:font script="Telu" typeface="Gautami"/>
+        <a:font script="Taml" typeface="Latha"/>
+        <a:font script="Syrc" typeface="Estrangelo Edessa"/>
+        <a:font script="Orya" typeface="Kalinga"/>
+        <a:font script="Mlym" typeface="Kartika"/>
+        <a:font script="Laoo" typeface="DokChampa"/>
+        <a:font script="Sinh" typeface="Iskoola Pota"/>
+        <a:font script="Mong" typeface="Mongolian Baiti"/>
+        <a:font script="Viet" typeface="Arial"/>
+        <a:font script="Uigh" typeface="Microsoft Uighur"/>
+        <a:font script="Geor" typeface="Sylfaen"/>
+      </a:minorFont>
+    </a:fontScheme>
+    <a:fmtScheme name="Office">
+      <a:fillStyleLst>
+        <a:solidFill>
+          <a:schemeClr val="phClr"/>
+        </a:solidFill>
+        <a:gradFill rotWithShape="1">
+          <a:gsLst>
+            <a:gs pos="0">
+              <a:schemeClr val="phClr">
+                <a:lumMod val="110000"/>
+                <a:satMod val="105000"/>
+                <a:tint val="67000"/>
+              </a:schemeClr>
+            </a:gs>
+            <a:gs pos="50000">
+              <a:schemeClr val="phClr">
+                <a:lumMod val="105000"/>
+                <a:satMod val="103000"/>
+                <a:tint val="73000"/>
+              </a:schemeClr>
+            </a:gs>
+            <a:gs pos="100000">
+              <a:schemeClr val="phClr">
+                <a:lumMod val="105000"/>
+                <a:satMod val="109000"/>
+                <a:tint val="81000"/>
+              </a:schemeClr>
+            </a:gs>
+          </a:gsLst>
+          <a:lin ang="5400000" scaled="0"/>
+        </a:gradFill>
+        <a:gradFill rotWithShape="1">
+          <a:gsLst>
+            <a:gs pos="0">
+              <a:schemeClr val="phClr">
+                <a:satMod val="103000"/>
+                <a:lumMod val="102000"/>
+                <a:tint val="94000"/>
+              </a:schemeClr>
+            </a:gs>
+            <a:gs pos="50000">
+              <a:schemeClr val="phClr">
+                <a:satMod val="110000"/>
+                <a:lumMod val="100000"/>
+                <a:shade val="100000"/>
+              </a:schemeClr>
+            </a:gs>
+            <a:gs pos="100000">
+              <a:schemeClr val="phClr">
+                <a:lumMod val="99000"/>
+                <a:satMod val="120000"/>
+                <a:shade val="78000"/>
+              </a:schemeClr>
+            </a:gs>
+          </a:gsLst>
+          <a:lin ang="5400000" scaled="0"/>
+        </a:gradFill>
+      </a:fillStyleLst>
+      <a:lnStyleLst>
+        <a:ln w="6350" cap="flat" cmpd="sng" algn="ctr">
+          <a:solidFill>
+            <a:schemeClr val="phClr"/>
+          </a:solidFill>
+          <a:prstDash val="solid"/>
+          <a:miter lim="800000"/>
+        </a:ln>
+        <a:ln w="12700" cap="flat" cmpd="sng" algn="ctr">
+          <a:solidFill>
+            <a:schemeClr val="phClr"/>
+          </a:solidFill>
+          <a:prstDash val="solid"/>
+          <a:miter lim="800000"/>
+        </a:ln>
+        <a:ln w="19050" cap="flat" cmpd="sng" algn="ctr">
+          <a:solidFill>
+            <a:schemeClr val="phClr"/>
+          </a:solidFill>
+          <a:prstDash val="solid"/>
+          <a:miter lim="800000"/>
+        </a:ln>
+      </a:lnStyleLst>
+      <a:effectStyleLst>
+        <a:effectStyle>
+          <a:effectLst/>
+        </a:effectStyle>
+        <a:effectStyle>
+          <a:effectLst/>
+        </a:effectStyle>
+        <a:effectStyle>
+          <a:effectLst>
+            <a:outerShdw blurRad="57150" dist="19050" dir="5400000" algn="ctr" rotWithShape="0">
+              <a:srgbClr val="000000">
+                <a:alpha val="63000"/>
+              </a:srgbClr>
+            </a:outerShdw>
+          </a:effectLst>
+        </a:effectStyle>
+      </a:effectStyleLst>
+      <a:bgFillStyleLst>
+        <a:solidFill>
+          <a:schemeClr val="phClr"/>
+        </a:solidFill>
+        <a:solidFill>
+          <a:schemeClr val="phClr">
+            <a:tint val="95000"/>
+            <a:satMod val="170000"/>
+          </a:schemeClr>
+        </a:solidFill>
+        <a:gradFill rotWithShape="1">
+          <a:gsLst>
+            <a:gs pos="0">
+              <a:schemeClr val="phClr">
+                <a:tint val="93000"/>
+                <a:satMod val="150000"/>
+                <a:shade val="98000"/>
+                <a:lumMod val="102000"/>
+              </a:schemeClr>
+            </a:gs>
+            <a:gs pos="50000">
+              <a:schemeClr val="phClr">
+                <a:tint val="98000"/>
+                <a:satMod val="130000"/>
+                <a:shade val="90000"/>
+                <a:lumMod val="103000"/>
+              </a:schemeClr>
+            </a:gs>
+            <a:gs pos="100000">
+              <a:schemeClr val="phClr">
+                <a:shade val="63000"/>
+                <a:satMod val="120000"/>
+              </a:schemeClr>
+            </a:gs>
+          </a:gsLst>
+          <a:lin ang="5400000" scaled="0"/>
+        </a:gradFill>
+      </a:bgFillStyleLst>
+    </a:fmtScheme>
+  </a:themeElements>
+  <a:objectDefaults/>
+  <a:extraClrSchemeLst/>
+  <a:extLst>
+    <a:ext uri="{05A4C25C-085E-4340-85A3-A5531E510DB2}">
+      <thm15:themeFamily xmlns:thm15="http://schemas.microsoft.com/office/thememl/2012/main" name="Office Theme" id="{62F939B6-93AF-4DB8-9C6B-D6C7DFDC589F}" vid="{4A3C46E8-61CC-4603-A589-7422A47A8E4A}"/>
+    </a:ext>
+  </a:extLst>
+</a:theme>
 </file>
</xml_diff>